<commit_message>
feat(IDEA): idea files updated
</commit_message>
<xml_diff>
--- a/Splunk-Build-A-Thon-Idea/Splunk-DNSGuard-AI-IDEA.pptx
+++ b/Splunk-Build-A-Thon-Idea/Splunk-DNSGuard-AI-IDEA.pptx
@@ -11420,8 +11420,21 @@
                   <a:schemeClr val="bg1"/>
                 </a:solidFill>
               </a:rPr>
-              <a:t>Management</a:t>
-            </a:r>
+              <a:t>Management </a:t>
+            </a:r>
+            <a:r>
+              <a:rPr lang="it-IT" b="1" dirty="0" err="1">
+                <a:solidFill>
+                  <a:schemeClr val="bg1"/>
+                </a:solidFill>
+              </a:rPr>
+              <a:t>View</a:t>
+            </a:r>
+            <a:endParaRPr lang="it-IT" b="1" dirty="0">
+              <a:solidFill>
+                <a:schemeClr val="bg1"/>
+              </a:solidFill>
+            </a:endParaRPr>
           </a:p>
         </p:txBody>
       </p:sp>
@@ -11486,8 +11499,8 @@
         </p:nvCxnSpPr>
         <p:spPr>
           <a:xfrm rot="5400000">
-            <a:off x="3826098" y="3560126"/>
-            <a:ext cx="2026655" cy="1055411"/>
+            <a:off x="3826098" y="3560127"/>
+            <a:ext cx="2026656" cy="1055409"/>
           </a:xfrm>
           <a:prstGeom prst="bentConnector3">
             <a:avLst/>
@@ -11530,12 +11543,12 @@
         </p:nvCxnSpPr>
         <p:spPr>
           <a:xfrm rot="10800000" flipV="1">
-            <a:off x="1921566" y="2736574"/>
-            <a:ext cx="1329979" cy="692424"/>
+            <a:off x="1921567" y="2729948"/>
+            <a:ext cx="1437860" cy="699050"/>
           </a:xfrm>
           <a:prstGeom prst="bentConnector3">
             <a:avLst>
-              <a:gd name="adj1" fmla="val 99821"/>
+              <a:gd name="adj1" fmla="val 100230"/>
             </a:avLst>
           </a:prstGeom>
           <a:ln>
@@ -11571,17 +11584,18 @@
           </p:cNvPr>
           <p:cNvCxnSpPr>
             <a:cxnSpLocks/>
+            <a:endCxn id="58" idx="0"/>
           </p:cNvCxnSpPr>
           <p:nvPr/>
         </p:nvCxnSpPr>
         <p:spPr>
-          <a:xfrm>
-            <a:off x="6824873" y="3074506"/>
-            <a:ext cx="853928" cy="801757"/>
+          <a:xfrm rot="16200000" flipH="1">
+            <a:off x="6731426" y="3167946"/>
+            <a:ext cx="1071152" cy="884265"/>
           </a:xfrm>
           <a:prstGeom prst="bentConnector3">
             <a:avLst>
-              <a:gd name="adj1" fmla="val 1115"/>
+              <a:gd name="adj1" fmla="val 50000"/>
             </a:avLst>
           </a:prstGeom>
           <a:ln>
@@ -11821,7 +11835,7 @@
         </p:nvGrpSpPr>
         <p:grpSpPr>
           <a:xfrm>
-            <a:off x="6463968" y="3927285"/>
+            <a:off x="6463968" y="4145655"/>
             <a:ext cx="2517595" cy="1877167"/>
             <a:chOff x="1701101" y="1802916"/>
             <a:chExt cx="8886021" cy="3784578"/>
@@ -11950,7 +11964,7 @@
         </p:nvSpPr>
         <p:spPr>
           <a:xfrm>
-            <a:off x="6008314" y="3976475"/>
+            <a:off x="6006219" y="4212992"/>
             <a:ext cx="3362959" cy="369332"/>
           </a:xfrm>
           <a:prstGeom prst="rect">
@@ -11971,8 +11985,21 @@
                   <a:schemeClr val="bg1"/>
                 </a:solidFill>
               </a:rPr>
-              <a:t>Dashboards</a:t>
-            </a:r>
+              <a:t>Dashboards </a:t>
+            </a:r>
+            <a:r>
+              <a:rPr lang="it-IT" b="1" dirty="0" err="1">
+                <a:solidFill>
+                  <a:schemeClr val="bg1"/>
+                </a:solidFill>
+              </a:rPr>
+              <a:t>View</a:t>
+            </a:r>
+            <a:endParaRPr lang="it-IT" b="1" dirty="0">
+              <a:solidFill>
+                <a:schemeClr val="bg1"/>
+              </a:solidFill>
+            </a:endParaRPr>
           </a:p>
         </p:txBody>
       </p:sp>
@@ -11990,7 +12017,7 @@
         </p:nvSpPr>
         <p:spPr>
           <a:xfrm>
-            <a:off x="6070346" y="4402294"/>
+            <a:off x="6070346" y="4620664"/>
             <a:ext cx="3290127" cy="1200329"/>
           </a:xfrm>
           <a:prstGeom prst="rect">
@@ -12235,13 +12262,34 @@
           <a:p>
             <a:pPr algn="ctr"/>
             <a:r>
+              <a:rPr lang="it-IT" b="1" dirty="0" err="1">
+                <a:solidFill>
+                  <a:schemeClr val="bg1"/>
+                </a:solidFill>
+              </a:rPr>
+              <a:t>Integrations</a:t>
+            </a:r>
+            <a:r>
               <a:rPr lang="it-IT" b="1" dirty="0">
                 <a:solidFill>
                   <a:schemeClr val="bg1"/>
                 </a:solidFill>
               </a:rPr>
-              <a:t>Integrations</a:t>
-            </a:r>
+              <a:t> </a:t>
+            </a:r>
+            <a:r>
+              <a:rPr lang="it-IT" b="1" dirty="0" err="1">
+                <a:solidFill>
+                  <a:schemeClr val="bg1"/>
+                </a:solidFill>
+              </a:rPr>
+              <a:t>View</a:t>
+            </a:r>
+            <a:endParaRPr lang="it-IT" b="1" dirty="0">
+              <a:solidFill>
+                <a:schemeClr val="bg1"/>
+              </a:solidFill>
+            </a:endParaRPr>
           </a:p>
         </p:txBody>
       </p:sp>

</xml_diff>

<commit_message>
feat(IDEA): ppt file updated
</commit_message>
<xml_diff>
--- a/Splunk-Build-A-Thon-Idea/Splunk-DNSGuard-AI-IDEA.pptx
+++ b/Splunk-Build-A-Thon-Idea/Splunk-DNSGuard-AI-IDEA.pptx
@@ -205,7 +205,7 @@
           <a:p>
             <a:fld id="{07B3BC97-3BC0-40FA-81A1-72ED287ACE70}" type="datetimeFigureOut">
               <a:rPr lang="it-IT" smtClean="0"/>
-              <a:t>16/05/2025</a:t>
+              <a:t>18/05/2025</a:t>
             </a:fld>
             <a:endParaRPr lang="it-IT" dirty="0"/>
           </a:p>
@@ -703,7 +703,7 @@
           <a:p>
             <a:fld id="{C94D923A-9170-4643-B378-C6ADCBE8E107}" type="datetimeFigureOut">
               <a:rPr lang="it-IT" smtClean="0"/>
-              <a:t>16/05/2025</a:t>
+              <a:t>18/05/2025</a:t>
             </a:fld>
             <a:endParaRPr lang="it-IT" dirty="0"/>
           </a:p>
@@ -901,7 +901,7 @@
           <a:p>
             <a:fld id="{C94D923A-9170-4643-B378-C6ADCBE8E107}" type="datetimeFigureOut">
               <a:rPr lang="it-IT" smtClean="0"/>
-              <a:t>16/05/2025</a:t>
+              <a:t>18/05/2025</a:t>
             </a:fld>
             <a:endParaRPr lang="it-IT" dirty="0"/>
           </a:p>
@@ -1109,7 +1109,7 @@
           <a:p>
             <a:fld id="{C94D923A-9170-4643-B378-C6ADCBE8E107}" type="datetimeFigureOut">
               <a:rPr lang="it-IT" smtClean="0"/>
-              <a:t>16/05/2025</a:t>
+              <a:t>18/05/2025</a:t>
             </a:fld>
             <a:endParaRPr lang="it-IT" dirty="0"/>
           </a:p>
@@ -1307,7 +1307,7 @@
           <a:p>
             <a:fld id="{C94D923A-9170-4643-B378-C6ADCBE8E107}" type="datetimeFigureOut">
               <a:rPr lang="it-IT" smtClean="0"/>
-              <a:t>16/05/2025</a:t>
+              <a:t>18/05/2025</a:t>
             </a:fld>
             <a:endParaRPr lang="it-IT" dirty="0"/>
           </a:p>
@@ -1582,7 +1582,7 @@
           <a:p>
             <a:fld id="{C94D923A-9170-4643-B378-C6ADCBE8E107}" type="datetimeFigureOut">
               <a:rPr lang="it-IT" smtClean="0"/>
-              <a:t>16/05/2025</a:t>
+              <a:t>18/05/2025</a:t>
             </a:fld>
             <a:endParaRPr lang="it-IT" dirty="0"/>
           </a:p>
@@ -1847,7 +1847,7 @@
           <a:p>
             <a:fld id="{C94D923A-9170-4643-B378-C6ADCBE8E107}" type="datetimeFigureOut">
               <a:rPr lang="it-IT" smtClean="0"/>
-              <a:t>16/05/2025</a:t>
+              <a:t>18/05/2025</a:t>
             </a:fld>
             <a:endParaRPr lang="it-IT" dirty="0"/>
           </a:p>
@@ -2259,7 +2259,7 @@
           <a:p>
             <a:fld id="{C94D923A-9170-4643-B378-C6ADCBE8E107}" type="datetimeFigureOut">
               <a:rPr lang="it-IT" smtClean="0"/>
-              <a:t>16/05/2025</a:t>
+              <a:t>18/05/2025</a:t>
             </a:fld>
             <a:endParaRPr lang="it-IT" dirty="0"/>
           </a:p>
@@ -2400,7 +2400,7 @@
           <a:p>
             <a:fld id="{C94D923A-9170-4643-B378-C6ADCBE8E107}" type="datetimeFigureOut">
               <a:rPr lang="it-IT" smtClean="0"/>
-              <a:t>16/05/2025</a:t>
+              <a:t>18/05/2025</a:t>
             </a:fld>
             <a:endParaRPr lang="it-IT" dirty="0"/>
           </a:p>
@@ -2513,7 +2513,7 @@
           <a:p>
             <a:fld id="{C94D923A-9170-4643-B378-C6ADCBE8E107}" type="datetimeFigureOut">
               <a:rPr lang="it-IT" smtClean="0"/>
-              <a:t>16/05/2025</a:t>
+              <a:t>18/05/2025</a:t>
             </a:fld>
             <a:endParaRPr lang="it-IT" dirty="0"/>
           </a:p>
@@ -2824,7 +2824,7 @@
           <a:p>
             <a:fld id="{C94D923A-9170-4643-B378-C6ADCBE8E107}" type="datetimeFigureOut">
               <a:rPr lang="it-IT" smtClean="0"/>
-              <a:t>16/05/2025</a:t>
+              <a:t>18/05/2025</a:t>
             </a:fld>
             <a:endParaRPr lang="it-IT" dirty="0"/>
           </a:p>
@@ -3112,7 +3112,7 @@
           <a:p>
             <a:fld id="{C94D923A-9170-4643-B378-C6ADCBE8E107}" type="datetimeFigureOut">
               <a:rPr lang="it-IT" smtClean="0"/>
-              <a:t>16/05/2025</a:t>
+              <a:t>18/05/2025</a:t>
             </a:fld>
             <a:endParaRPr lang="it-IT" dirty="0"/>
           </a:p>
@@ -3353,7 +3353,7 @@
           <a:p>
             <a:fld id="{C94D923A-9170-4643-B378-C6ADCBE8E107}" type="datetimeFigureOut">
               <a:rPr lang="it-IT" smtClean="0"/>
-              <a:t>16/05/2025</a:t>
+              <a:t>18/05/2025</a:t>
             </a:fld>
             <a:endParaRPr lang="it-IT" dirty="0"/>
           </a:p>
@@ -4654,8 +4654,8 @@
         </p:nvSpPr>
         <p:spPr>
           <a:xfrm>
-            <a:off x="8315735" y="90355"/>
-            <a:ext cx="3667542" cy="923330"/>
+            <a:off x="8249477" y="90355"/>
+            <a:ext cx="3733799" cy="923330"/>
           </a:xfrm>
           <a:prstGeom prst="rect">
             <a:avLst/>
@@ -4674,7 +4674,7 @@
                   <a:schemeClr val="bg1"/>
                 </a:solidFill>
               </a:rPr>
-              <a:t>Key Benefits</a:t>
+              <a:t>Key Features</a:t>
             </a:r>
           </a:p>
         </p:txBody>
@@ -4728,10 +4728,10 @@
       </p:sp>
       <p:grpSp>
         <p:nvGrpSpPr>
-          <p:cNvPr id="10" name="Gruppo 9">
-            <a:extLst>
-              <a:ext uri="{FF2B5EF4-FFF2-40B4-BE49-F238E27FC236}">
-                <a16:creationId xmlns:a16="http://schemas.microsoft.com/office/drawing/2014/main" id="{61B34005-7358-4DA6-34D6-A62A28645744}"/>
+          <p:cNvPr id="42" name="Gruppo 41">
+            <a:extLst>
+              <a:ext uri="{FF2B5EF4-FFF2-40B4-BE49-F238E27FC236}">
+                <a16:creationId xmlns:a16="http://schemas.microsoft.com/office/drawing/2014/main" id="{9F766FEB-3B96-33D7-56E0-8560F3080AA5}"/>
               </a:ext>
             </a:extLst>
           </p:cNvPr>
@@ -4740,18 +4740,18 @@
         </p:nvGrpSpPr>
         <p:grpSpPr>
           <a:xfrm>
-            <a:off x="2733041" y="2723899"/>
-            <a:ext cx="3362959" cy="830997"/>
+            <a:off x="7852470" y="2134615"/>
+            <a:ext cx="3362959" cy="1313218"/>
             <a:chOff x="1701101" y="1802916"/>
             <a:chExt cx="8886021" cy="3784578"/>
           </a:xfrm>
         </p:grpSpPr>
         <p:sp>
           <p:nvSpPr>
-            <p:cNvPr id="12" name="Rettangolo con angoli arrotondati 11">
+            <p:cNvPr id="43" name="Rettangolo con angoli arrotondati 42">
               <a:extLst>
                 <a:ext uri="{FF2B5EF4-FFF2-40B4-BE49-F238E27FC236}">
-                  <a16:creationId xmlns:a16="http://schemas.microsoft.com/office/drawing/2014/main" id="{5B1B10BA-230E-7A52-65E4-D29D2962FAD7}"/>
+                  <a16:creationId xmlns:a16="http://schemas.microsoft.com/office/drawing/2014/main" id="{2A53693C-F4DF-F990-98A1-6DCF85504828}"/>
                 </a:ext>
               </a:extLst>
             </p:cNvPr>
@@ -4802,10 +4802,10 @@
         </p:sp>
         <p:sp>
           <p:nvSpPr>
-            <p:cNvPr id="11" name="Rettangolo con angoli arrotondati 10">
+            <p:cNvPr id="44" name="Rettangolo con angoli arrotondati 43">
               <a:extLst>
                 <a:ext uri="{FF2B5EF4-FFF2-40B4-BE49-F238E27FC236}">
-                  <a16:creationId xmlns:a16="http://schemas.microsoft.com/office/drawing/2014/main" id="{C20ABDC0-3972-C0EA-56B0-7B74A8D84895}"/>
+                  <a16:creationId xmlns:a16="http://schemas.microsoft.com/office/drawing/2014/main" id="{A2139258-F847-96F5-FEB6-766D97D7F02C}"/>
                 </a:ext>
               </a:extLst>
             </p:cNvPr>
@@ -4857,10 +4857,10 @@
       </p:grpSp>
       <p:grpSp>
         <p:nvGrpSpPr>
-          <p:cNvPr id="13" name="Gruppo 12">
-            <a:extLst>
-              <a:ext uri="{FF2B5EF4-FFF2-40B4-BE49-F238E27FC236}">
-                <a16:creationId xmlns:a16="http://schemas.microsoft.com/office/drawing/2014/main" id="{1DF12B9C-5F20-F8B2-B6F4-EC2ECAFFD215}"/>
+          <p:cNvPr id="45" name="Gruppo 44">
+            <a:extLst>
+              <a:ext uri="{FF2B5EF4-FFF2-40B4-BE49-F238E27FC236}">
+                <a16:creationId xmlns:a16="http://schemas.microsoft.com/office/drawing/2014/main" id="{3AE6ECD9-B6B4-AB26-C661-22E71A552260}"/>
               </a:ext>
             </a:extLst>
           </p:cNvPr>
@@ -4869,18 +4869,18 @@
         </p:nvGrpSpPr>
         <p:grpSpPr>
           <a:xfrm>
-            <a:off x="2714832" y="3782371"/>
-            <a:ext cx="3362959" cy="830997"/>
+            <a:off x="7852470" y="4958669"/>
+            <a:ext cx="3362959" cy="1280405"/>
             <a:chOff x="1701101" y="1802916"/>
             <a:chExt cx="8886021" cy="3784578"/>
           </a:xfrm>
         </p:grpSpPr>
         <p:sp>
           <p:nvSpPr>
-            <p:cNvPr id="14" name="Rettangolo con angoli arrotondati 13">
+            <p:cNvPr id="46" name="Rettangolo con angoli arrotondati 45">
               <a:extLst>
                 <a:ext uri="{FF2B5EF4-FFF2-40B4-BE49-F238E27FC236}">
-                  <a16:creationId xmlns:a16="http://schemas.microsoft.com/office/drawing/2014/main" id="{3D2CB201-00DA-A38B-3587-DFA63F2C134C}"/>
+                  <a16:creationId xmlns:a16="http://schemas.microsoft.com/office/drawing/2014/main" id="{41F22C12-AA96-0367-77CC-C2C2AF5CA7D4}"/>
                 </a:ext>
               </a:extLst>
             </p:cNvPr>
@@ -4931,10 +4931,709 @@
         </p:sp>
         <p:sp>
           <p:nvSpPr>
-            <p:cNvPr id="15" name="Rettangolo con angoli arrotondati 14">
+            <p:cNvPr id="47" name="Rettangolo con angoli arrotondati 46">
               <a:extLst>
                 <a:ext uri="{FF2B5EF4-FFF2-40B4-BE49-F238E27FC236}">
-                  <a16:creationId xmlns:a16="http://schemas.microsoft.com/office/drawing/2014/main" id="{F57369C5-217D-3461-8EC9-F38D7FF8520E}"/>
+                  <a16:creationId xmlns:a16="http://schemas.microsoft.com/office/drawing/2014/main" id="{92C68214-A31F-158E-1586-C393166B123D}"/>
+                </a:ext>
+              </a:extLst>
+            </p:cNvPr>
+            <p:cNvSpPr/>
+            <p:nvPr/>
+          </p:nvSpPr>
+          <p:spPr>
+            <a:xfrm>
+              <a:off x="1701101" y="1802916"/>
+              <a:ext cx="8789797" cy="3690014"/>
+            </a:xfrm>
+            <a:prstGeom prst="roundRect">
+              <a:avLst/>
+            </a:prstGeom>
+            <a:solidFill>
+              <a:srgbClr val="012F5F"/>
+            </a:solidFill>
+            <a:ln>
+              <a:solidFill>
+                <a:srgbClr val="012F5F"/>
+              </a:solidFill>
+            </a:ln>
+          </p:spPr>
+          <p:style>
+            <a:lnRef idx="2">
+              <a:schemeClr val="accent1">
+                <a:shade val="15000"/>
+              </a:schemeClr>
+            </a:lnRef>
+            <a:fillRef idx="1">
+              <a:schemeClr val="accent1"/>
+            </a:fillRef>
+            <a:effectRef idx="0">
+              <a:schemeClr val="accent1"/>
+            </a:effectRef>
+            <a:fontRef idx="minor">
+              <a:schemeClr val="lt1"/>
+            </a:fontRef>
+          </p:style>
+          <p:txBody>
+            <a:bodyPr rtlCol="0" anchor="ctr"/>
+            <a:lstStyle/>
+            <a:p>
+              <a:pPr algn="ctr"/>
+              <a:endParaRPr lang="it-IT" dirty="0"/>
+            </a:p>
+          </p:txBody>
+        </p:sp>
+      </p:grpSp>
+      <p:sp>
+        <p:nvSpPr>
+          <p:cNvPr id="48" name="CasellaDiTesto 47">
+            <a:extLst>
+              <a:ext uri="{FF2B5EF4-FFF2-40B4-BE49-F238E27FC236}">
+                <a16:creationId xmlns:a16="http://schemas.microsoft.com/office/drawing/2014/main" id="{4CE1E853-74C8-8E8A-A4D9-AC93E3A46BA8}"/>
+              </a:ext>
+            </a:extLst>
+          </p:cNvPr>
+          <p:cNvSpPr txBox="1"/>
+          <p:nvPr/>
+        </p:nvSpPr>
+        <p:spPr>
+          <a:xfrm>
+            <a:off x="7852470" y="2218587"/>
+            <a:ext cx="3362959" cy="369332"/>
+          </a:xfrm>
+          <a:prstGeom prst="rect">
+            <a:avLst/>
+          </a:prstGeom>
+          <a:noFill/>
+        </p:spPr>
+        <p:txBody>
+          <a:bodyPr wrap="square" rtlCol="0">
+            <a:spAutoFit/>
+          </a:bodyPr>
+          <a:lstStyle/>
+          <a:p>
+            <a:pPr algn="ctr"/>
+            <a:r>
+              <a:rPr lang="it-IT" b="1" dirty="0">
+                <a:solidFill>
+                  <a:schemeClr val="bg1"/>
+                </a:solidFill>
+              </a:rPr>
+              <a:t>Enterprise-Ready</a:t>
+            </a:r>
+          </a:p>
+        </p:txBody>
+      </p:sp>
+      <p:sp>
+        <p:nvSpPr>
+          <p:cNvPr id="49" name="CasellaDiTesto 48">
+            <a:extLst>
+              <a:ext uri="{FF2B5EF4-FFF2-40B4-BE49-F238E27FC236}">
+                <a16:creationId xmlns:a16="http://schemas.microsoft.com/office/drawing/2014/main" id="{DD7DC982-126B-45E5-D09E-15AC0C6DC4BA}"/>
+              </a:ext>
+            </a:extLst>
+          </p:cNvPr>
+          <p:cNvSpPr txBox="1"/>
+          <p:nvPr/>
+        </p:nvSpPr>
+        <p:spPr>
+          <a:xfrm>
+            <a:off x="7852470" y="5007859"/>
+            <a:ext cx="3362959" cy="369332"/>
+          </a:xfrm>
+          <a:prstGeom prst="rect">
+            <a:avLst/>
+          </a:prstGeom>
+          <a:noFill/>
+        </p:spPr>
+        <p:txBody>
+          <a:bodyPr wrap="square" rtlCol="0">
+            <a:spAutoFit/>
+          </a:bodyPr>
+          <a:lstStyle/>
+          <a:p>
+            <a:pPr algn="ctr"/>
+            <a:r>
+              <a:rPr lang="it-IT" b="1" dirty="0">
+                <a:solidFill>
+                  <a:schemeClr val="bg1"/>
+                </a:solidFill>
+              </a:rPr>
+              <a:t>Dashboard System</a:t>
+            </a:r>
+          </a:p>
+        </p:txBody>
+      </p:sp>
+      <p:pic>
+        <p:nvPicPr>
+          <p:cNvPr id="50" name="Immagine 49" descr="Immagine che contiene simbolo, logo, cerchio, Elementi grafici&#10;&#10;Il contenuto generato dall'IA potrebbe non essere corretto.">
+            <a:extLst>
+              <a:ext uri="{FF2B5EF4-FFF2-40B4-BE49-F238E27FC236}">
+                <a16:creationId xmlns:a16="http://schemas.microsoft.com/office/drawing/2014/main" id="{BA0F8399-6845-1650-C05D-3671952D731C}"/>
+              </a:ext>
+            </a:extLst>
+          </p:cNvPr>
+          <p:cNvPicPr>
+            <a:picLocks noChangeAspect="1"/>
+          </p:cNvPicPr>
+          <p:nvPr/>
+        </p:nvPicPr>
+        <p:blipFill>
+          <a:blip r:embed="rId2">
+            <a:extLst>
+              <a:ext uri="{28A0092B-C50C-407E-A947-70E740481C1C}">
+                <a14:useLocalDpi xmlns:a14="http://schemas.microsoft.com/office/drawing/2010/main" val="0"/>
+              </a:ext>
+            </a:extLst>
+          </a:blip>
+          <a:stretch>
+            <a:fillRect/>
+          </a:stretch>
+        </p:blipFill>
+        <p:spPr>
+          <a:xfrm>
+            <a:off x="4451421" y="2470984"/>
+            <a:ext cx="3313043" cy="3313043"/>
+          </a:xfrm>
+          <a:prstGeom prst="rect">
+            <a:avLst/>
+          </a:prstGeom>
+        </p:spPr>
+      </p:pic>
+      <p:sp>
+        <p:nvSpPr>
+          <p:cNvPr id="51" name="CasellaDiTesto 50">
+            <a:extLst>
+              <a:ext uri="{FF2B5EF4-FFF2-40B4-BE49-F238E27FC236}">
+                <a16:creationId xmlns:a16="http://schemas.microsoft.com/office/drawing/2014/main" id="{E9321962-CB36-1850-C650-4394B7F30C75}"/>
+              </a:ext>
+            </a:extLst>
+          </p:cNvPr>
+          <p:cNvSpPr txBox="1"/>
+          <p:nvPr/>
+        </p:nvSpPr>
+        <p:spPr>
+          <a:xfrm>
+            <a:off x="8350397" y="2708767"/>
+            <a:ext cx="2330686" cy="461665"/>
+          </a:xfrm>
+          <a:prstGeom prst="rect">
+            <a:avLst/>
+          </a:prstGeom>
+          <a:noFill/>
+        </p:spPr>
+        <p:txBody>
+          <a:bodyPr wrap="square" rtlCol="0">
+            <a:spAutoFit/>
+          </a:bodyPr>
+          <a:lstStyle/>
+          <a:p>
+            <a:pPr algn="ctr"/>
+            <a:r>
+              <a:rPr lang="it-IT" sz="1200" b="0" i="0" dirty="0">
+                <a:solidFill>
+                  <a:srgbClr val="F0F6FC"/>
+                </a:solidFill>
+                <a:effectLst/>
+                <a:latin typeface="-apple-system"/>
+              </a:rPr>
+              <a:t>Scalable </a:t>
+            </a:r>
+            <a:r>
+              <a:rPr lang="it-IT" sz="1200" b="0" i="0" dirty="0" err="1">
+                <a:solidFill>
+                  <a:srgbClr val="F0F6FC"/>
+                </a:solidFill>
+                <a:effectLst/>
+                <a:latin typeface="-apple-system"/>
+              </a:rPr>
+              <a:t>solution</a:t>
+            </a:r>
+            <a:r>
+              <a:rPr lang="it-IT" sz="1200" b="0" i="0" dirty="0">
+                <a:solidFill>
+                  <a:srgbClr val="F0F6FC"/>
+                </a:solidFill>
+                <a:effectLst/>
+                <a:latin typeface="-apple-system"/>
+              </a:rPr>
+              <a:t> </a:t>
+            </a:r>
+            <a:r>
+              <a:rPr lang="it-IT" sz="1200" b="0" i="0" dirty="0" err="1">
+                <a:solidFill>
+                  <a:srgbClr val="F0F6FC"/>
+                </a:solidFill>
+                <a:effectLst/>
+                <a:latin typeface="-apple-system"/>
+              </a:rPr>
+              <a:t>designed</a:t>
+            </a:r>
+            <a:r>
+              <a:rPr lang="it-IT" sz="1200" b="0" i="0" dirty="0">
+                <a:solidFill>
+                  <a:srgbClr val="F0F6FC"/>
+                </a:solidFill>
+                <a:effectLst/>
+                <a:latin typeface="-apple-system"/>
+              </a:rPr>
+              <a:t> for large network </a:t>
+            </a:r>
+            <a:r>
+              <a:rPr lang="it-IT" sz="1200" b="0" i="0" dirty="0" err="1">
+                <a:solidFill>
+                  <a:srgbClr val="F0F6FC"/>
+                </a:solidFill>
+                <a:effectLst/>
+                <a:latin typeface="-apple-system"/>
+              </a:rPr>
+              <a:t>environments</a:t>
+            </a:r>
+            <a:endParaRPr lang="it-IT" sz="1200" dirty="0">
+              <a:solidFill>
+                <a:schemeClr val="bg1"/>
+              </a:solidFill>
+            </a:endParaRPr>
+          </a:p>
+        </p:txBody>
+      </p:sp>
+      <p:sp>
+        <p:nvSpPr>
+          <p:cNvPr id="52" name="CasellaDiTesto 51">
+            <a:extLst>
+              <a:ext uri="{FF2B5EF4-FFF2-40B4-BE49-F238E27FC236}">
+                <a16:creationId xmlns:a16="http://schemas.microsoft.com/office/drawing/2014/main" id="{B9CC3340-43A3-EF93-BA26-6F8480D424BD}"/>
+              </a:ext>
+            </a:extLst>
+          </p:cNvPr>
+          <p:cNvSpPr txBox="1"/>
+          <p:nvPr/>
+        </p:nvSpPr>
+        <p:spPr>
+          <a:xfrm>
+            <a:off x="8186839" y="5333165"/>
+            <a:ext cx="2644817" cy="830997"/>
+          </a:xfrm>
+          <a:prstGeom prst="rect">
+            <a:avLst/>
+          </a:prstGeom>
+          <a:noFill/>
+        </p:spPr>
+        <p:txBody>
+          <a:bodyPr wrap="square" rtlCol="0">
+            <a:spAutoFit/>
+          </a:bodyPr>
+          <a:lstStyle/>
+          <a:p>
+            <a:pPr algn="ctr"/>
+            <a:r>
+              <a:rPr lang="en-US" sz="1200" b="0" i="0" dirty="0">
+                <a:solidFill>
+                  <a:srgbClr val="F0F6FC"/>
+                </a:solidFill>
+                <a:effectLst/>
+                <a:latin typeface="-apple-system"/>
+              </a:rPr>
+              <a:t>Specialized dashboards for each detection method and an overview dashboard for high-level threat monitoring.</a:t>
+            </a:r>
+            <a:endParaRPr lang="it-IT" sz="1200" dirty="0">
+              <a:solidFill>
+                <a:schemeClr val="bg1"/>
+              </a:solidFill>
+            </a:endParaRPr>
+          </a:p>
+        </p:txBody>
+      </p:sp>
+      <p:cxnSp>
+        <p:nvCxnSpPr>
+          <p:cNvPr id="53" name="Connettore a gomito 52">
+            <a:extLst>
+              <a:ext uri="{FF2B5EF4-FFF2-40B4-BE49-F238E27FC236}">
+                <a16:creationId xmlns:a16="http://schemas.microsoft.com/office/drawing/2014/main" id="{64649A97-3C8B-01E0-6B4B-C02515390F3D}"/>
+              </a:ext>
+            </a:extLst>
+          </p:cNvPr>
+          <p:cNvCxnSpPr>
+            <a:cxnSpLocks/>
+            <a:endCxn id="47" idx="1"/>
+          </p:cNvCxnSpPr>
+          <p:nvPr/>
+        </p:nvCxnSpPr>
+        <p:spPr>
+          <a:xfrm>
+            <a:off x="7194210" y="4127506"/>
+            <a:ext cx="658260" cy="1455369"/>
+          </a:xfrm>
+          <a:prstGeom prst="bentConnector3">
+            <a:avLst>
+              <a:gd name="adj1" fmla="val 50000"/>
+            </a:avLst>
+          </a:prstGeom>
+          <a:ln>
+            <a:solidFill>
+              <a:schemeClr val="bg1"/>
+            </a:solidFill>
+            <a:tailEnd type="triangle"/>
+          </a:ln>
+        </p:spPr>
+        <p:style>
+          <a:lnRef idx="2">
+            <a:schemeClr val="accent1"/>
+          </a:lnRef>
+          <a:fillRef idx="0">
+            <a:schemeClr val="accent1"/>
+          </a:fillRef>
+          <a:effectRef idx="1">
+            <a:schemeClr val="accent1"/>
+          </a:effectRef>
+          <a:fontRef idx="minor">
+            <a:schemeClr val="tx1"/>
+          </a:fontRef>
+        </p:style>
+      </p:cxnSp>
+      <p:cxnSp>
+        <p:nvCxnSpPr>
+          <p:cNvPr id="54" name="Connettore a gomito 53">
+            <a:extLst>
+              <a:ext uri="{FF2B5EF4-FFF2-40B4-BE49-F238E27FC236}">
+                <a16:creationId xmlns:a16="http://schemas.microsoft.com/office/drawing/2014/main" id="{627E4C94-918E-3B02-3144-EB94133A7B9A}"/>
+              </a:ext>
+            </a:extLst>
+          </p:cNvPr>
+          <p:cNvCxnSpPr>
+            <a:cxnSpLocks/>
+            <a:endCxn id="44" idx="1"/>
+          </p:cNvCxnSpPr>
+          <p:nvPr/>
+        </p:nvCxnSpPr>
+        <p:spPr>
+          <a:xfrm flipV="1">
+            <a:off x="7194210" y="2774818"/>
+            <a:ext cx="658260" cy="1352688"/>
+          </a:xfrm>
+          <a:prstGeom prst="bentConnector3">
+            <a:avLst>
+              <a:gd name="adj1" fmla="val 50000"/>
+            </a:avLst>
+          </a:prstGeom>
+          <a:ln>
+            <a:solidFill>
+              <a:schemeClr val="bg1"/>
+            </a:solidFill>
+            <a:tailEnd type="triangle"/>
+          </a:ln>
+        </p:spPr>
+        <p:style>
+          <a:lnRef idx="2">
+            <a:schemeClr val="accent1"/>
+          </a:lnRef>
+          <a:fillRef idx="0">
+            <a:schemeClr val="accent1"/>
+          </a:fillRef>
+          <a:effectRef idx="1">
+            <a:schemeClr val="accent1"/>
+          </a:effectRef>
+          <a:fontRef idx="minor">
+            <a:schemeClr val="tx1"/>
+          </a:fontRef>
+        </p:style>
+      </p:cxnSp>
+      <p:grpSp>
+        <p:nvGrpSpPr>
+          <p:cNvPr id="55" name="Gruppo 54">
+            <a:extLst>
+              <a:ext uri="{FF2B5EF4-FFF2-40B4-BE49-F238E27FC236}">
+                <a16:creationId xmlns:a16="http://schemas.microsoft.com/office/drawing/2014/main" id="{569E7E03-22A6-CE02-1302-B095DFD6A2DB}"/>
+              </a:ext>
+            </a:extLst>
+          </p:cNvPr>
+          <p:cNvGrpSpPr/>
+          <p:nvPr/>
+        </p:nvGrpSpPr>
+        <p:grpSpPr>
+          <a:xfrm>
+            <a:off x="7852470" y="3546371"/>
+            <a:ext cx="3362959" cy="1313218"/>
+            <a:chOff x="1701101" y="1802916"/>
+            <a:chExt cx="8886021" cy="3784578"/>
+          </a:xfrm>
+        </p:grpSpPr>
+        <p:sp>
+          <p:nvSpPr>
+            <p:cNvPr id="56" name="Rettangolo con angoli arrotondati 55">
+              <a:extLst>
+                <a:ext uri="{FF2B5EF4-FFF2-40B4-BE49-F238E27FC236}">
+                  <a16:creationId xmlns:a16="http://schemas.microsoft.com/office/drawing/2014/main" id="{31ADA056-71B6-8CF0-EA9F-075FCDF79F77}"/>
+                </a:ext>
+              </a:extLst>
+            </p:cNvPr>
+            <p:cNvSpPr/>
+            <p:nvPr/>
+          </p:nvSpPr>
+          <p:spPr>
+            <a:xfrm>
+              <a:off x="1797325" y="1897480"/>
+              <a:ext cx="8789797" cy="3690014"/>
+            </a:xfrm>
+            <a:prstGeom prst="roundRect">
+              <a:avLst/>
+            </a:prstGeom>
+            <a:solidFill>
+              <a:schemeClr val="tx1"/>
+            </a:solidFill>
+            <a:ln>
+              <a:solidFill>
+                <a:schemeClr val="tx1"/>
+              </a:solidFill>
+            </a:ln>
+          </p:spPr>
+          <p:style>
+            <a:lnRef idx="2">
+              <a:schemeClr val="accent1">
+                <a:shade val="15000"/>
+              </a:schemeClr>
+            </a:lnRef>
+            <a:fillRef idx="1">
+              <a:schemeClr val="accent1"/>
+            </a:fillRef>
+            <a:effectRef idx="0">
+              <a:schemeClr val="accent1"/>
+            </a:effectRef>
+            <a:fontRef idx="minor">
+              <a:schemeClr val="lt1"/>
+            </a:fontRef>
+          </p:style>
+          <p:txBody>
+            <a:bodyPr rtlCol="0" anchor="ctr"/>
+            <a:lstStyle/>
+            <a:p>
+              <a:pPr algn="ctr"/>
+              <a:endParaRPr lang="it-IT" dirty="0"/>
+            </a:p>
+          </p:txBody>
+        </p:sp>
+        <p:sp>
+          <p:nvSpPr>
+            <p:cNvPr id="57" name="Rettangolo con angoli arrotondati 56">
+              <a:extLst>
+                <a:ext uri="{FF2B5EF4-FFF2-40B4-BE49-F238E27FC236}">
+                  <a16:creationId xmlns:a16="http://schemas.microsoft.com/office/drawing/2014/main" id="{DB60C625-C670-C038-B00E-5E1D7D9A3C03}"/>
+                </a:ext>
+              </a:extLst>
+            </p:cNvPr>
+            <p:cNvSpPr/>
+            <p:nvPr/>
+          </p:nvSpPr>
+          <p:spPr>
+            <a:xfrm>
+              <a:off x="1701101" y="1802916"/>
+              <a:ext cx="8789797" cy="3690014"/>
+            </a:xfrm>
+            <a:prstGeom prst="roundRect">
+              <a:avLst/>
+            </a:prstGeom>
+            <a:solidFill>
+              <a:srgbClr val="012F5F"/>
+            </a:solidFill>
+            <a:ln>
+              <a:solidFill>
+                <a:srgbClr val="012F5F"/>
+              </a:solidFill>
+            </a:ln>
+          </p:spPr>
+          <p:style>
+            <a:lnRef idx="2">
+              <a:schemeClr val="accent1">
+                <a:shade val="15000"/>
+              </a:schemeClr>
+            </a:lnRef>
+            <a:fillRef idx="1">
+              <a:schemeClr val="accent1"/>
+            </a:fillRef>
+            <a:effectRef idx="0">
+              <a:schemeClr val="accent1"/>
+            </a:effectRef>
+            <a:fontRef idx="minor">
+              <a:schemeClr val="lt1"/>
+            </a:fontRef>
+          </p:style>
+          <p:txBody>
+            <a:bodyPr rtlCol="0" anchor="ctr"/>
+            <a:lstStyle/>
+            <a:p>
+              <a:pPr algn="ctr"/>
+              <a:endParaRPr lang="it-IT" dirty="0"/>
+            </a:p>
+          </p:txBody>
+        </p:sp>
+      </p:grpSp>
+      <p:sp>
+        <p:nvSpPr>
+          <p:cNvPr id="58" name="CasellaDiTesto 57">
+            <a:extLst>
+              <a:ext uri="{FF2B5EF4-FFF2-40B4-BE49-F238E27FC236}">
+                <a16:creationId xmlns:a16="http://schemas.microsoft.com/office/drawing/2014/main" id="{0664A3FE-9C84-A7FA-2B2D-E30D560CAB40}"/>
+              </a:ext>
+            </a:extLst>
+          </p:cNvPr>
+          <p:cNvSpPr txBox="1"/>
+          <p:nvPr/>
+        </p:nvSpPr>
+        <p:spPr>
+          <a:xfrm>
+            <a:off x="7852470" y="3630343"/>
+            <a:ext cx="3362959" cy="369332"/>
+          </a:xfrm>
+          <a:prstGeom prst="rect">
+            <a:avLst/>
+          </a:prstGeom>
+          <a:noFill/>
+        </p:spPr>
+        <p:txBody>
+          <a:bodyPr wrap="square" rtlCol="0">
+            <a:spAutoFit/>
+          </a:bodyPr>
+          <a:lstStyle/>
+          <a:p>
+            <a:pPr algn="ctr"/>
+            <a:r>
+              <a:rPr lang="it-IT" b="1" dirty="0">
+                <a:solidFill>
+                  <a:schemeClr val="bg1"/>
+                </a:solidFill>
+              </a:rPr>
+              <a:t>CIM Compliance</a:t>
+            </a:r>
+          </a:p>
+        </p:txBody>
+      </p:sp>
+      <p:sp>
+        <p:nvSpPr>
+          <p:cNvPr id="59" name="CasellaDiTesto 58">
+            <a:extLst>
+              <a:ext uri="{FF2B5EF4-FFF2-40B4-BE49-F238E27FC236}">
+                <a16:creationId xmlns:a16="http://schemas.microsoft.com/office/drawing/2014/main" id="{1C23D67B-7E55-E319-3E2F-A9FEBCA4A076}"/>
+              </a:ext>
+            </a:extLst>
+          </p:cNvPr>
+          <p:cNvSpPr txBox="1"/>
+          <p:nvPr/>
+        </p:nvSpPr>
+        <p:spPr>
+          <a:xfrm>
+            <a:off x="8350397" y="4135512"/>
+            <a:ext cx="2330686" cy="461665"/>
+          </a:xfrm>
+          <a:prstGeom prst="rect">
+            <a:avLst/>
+          </a:prstGeom>
+          <a:noFill/>
+        </p:spPr>
+        <p:txBody>
+          <a:bodyPr wrap="square" rtlCol="0">
+            <a:spAutoFit/>
+          </a:bodyPr>
+          <a:lstStyle/>
+          <a:p>
+            <a:pPr algn="ctr"/>
+            <a:r>
+              <a:rPr lang="en-US" sz="1200" b="0" i="0" dirty="0">
+                <a:solidFill>
+                  <a:srgbClr val="F0F6FC"/>
+                </a:solidFill>
+                <a:effectLst/>
+                <a:latin typeface="-apple-system"/>
+              </a:rPr>
+              <a:t>Fully compatible with Splunk's Common Information Model</a:t>
+            </a:r>
+            <a:endParaRPr lang="it-IT" sz="1200" dirty="0">
+              <a:solidFill>
+                <a:schemeClr val="bg1"/>
+              </a:solidFill>
+            </a:endParaRPr>
+          </a:p>
+        </p:txBody>
+      </p:sp>
+      <p:grpSp>
+        <p:nvGrpSpPr>
+          <p:cNvPr id="67" name="Gruppo 66">
+            <a:extLst>
+              <a:ext uri="{FF2B5EF4-FFF2-40B4-BE49-F238E27FC236}">
+                <a16:creationId xmlns:a16="http://schemas.microsoft.com/office/drawing/2014/main" id="{56D97C02-495B-1587-F15D-9964E4C02CF3}"/>
+              </a:ext>
+            </a:extLst>
+          </p:cNvPr>
+          <p:cNvGrpSpPr/>
+          <p:nvPr/>
+        </p:nvGrpSpPr>
+        <p:grpSpPr>
+          <a:xfrm>
+            <a:off x="1003464" y="2134615"/>
+            <a:ext cx="3362959" cy="1313218"/>
+            <a:chOff x="1701101" y="1802916"/>
+            <a:chExt cx="8886021" cy="3784578"/>
+          </a:xfrm>
+        </p:grpSpPr>
+        <p:sp>
+          <p:nvSpPr>
+            <p:cNvPr id="68" name="Rettangolo con angoli arrotondati 67">
+              <a:extLst>
+                <a:ext uri="{FF2B5EF4-FFF2-40B4-BE49-F238E27FC236}">
+                  <a16:creationId xmlns:a16="http://schemas.microsoft.com/office/drawing/2014/main" id="{A6B459E9-0F4B-212B-280B-F0280A83162A}"/>
+                </a:ext>
+              </a:extLst>
+            </p:cNvPr>
+            <p:cNvSpPr/>
+            <p:nvPr/>
+          </p:nvSpPr>
+          <p:spPr>
+            <a:xfrm>
+              <a:off x="1797325" y="1897480"/>
+              <a:ext cx="8789797" cy="3690014"/>
+            </a:xfrm>
+            <a:prstGeom prst="roundRect">
+              <a:avLst/>
+            </a:prstGeom>
+            <a:solidFill>
+              <a:schemeClr val="tx1"/>
+            </a:solidFill>
+            <a:ln>
+              <a:solidFill>
+                <a:schemeClr val="tx1"/>
+              </a:solidFill>
+            </a:ln>
+          </p:spPr>
+          <p:style>
+            <a:lnRef idx="2">
+              <a:schemeClr val="accent1">
+                <a:shade val="15000"/>
+              </a:schemeClr>
+            </a:lnRef>
+            <a:fillRef idx="1">
+              <a:schemeClr val="accent1"/>
+            </a:fillRef>
+            <a:effectRef idx="0">
+              <a:schemeClr val="accent1"/>
+            </a:effectRef>
+            <a:fontRef idx="minor">
+              <a:schemeClr val="lt1"/>
+            </a:fontRef>
+          </p:style>
+          <p:txBody>
+            <a:bodyPr rtlCol="0" anchor="ctr"/>
+            <a:lstStyle/>
+            <a:p>
+              <a:pPr algn="ctr"/>
+              <a:endParaRPr lang="it-IT" dirty="0"/>
+            </a:p>
+          </p:txBody>
+        </p:sp>
+        <p:sp>
+          <p:nvSpPr>
+            <p:cNvPr id="69" name="Rettangolo con angoli arrotondati 68">
+              <a:extLst>
+                <a:ext uri="{FF2B5EF4-FFF2-40B4-BE49-F238E27FC236}">
+                  <a16:creationId xmlns:a16="http://schemas.microsoft.com/office/drawing/2014/main" id="{39CED0EC-AEBF-A18E-F9F9-D70452F9B265}"/>
                 </a:ext>
               </a:extLst>
             </p:cNvPr>
@@ -4986,10 +5685,10 @@
       </p:grpSp>
       <p:grpSp>
         <p:nvGrpSpPr>
-          <p:cNvPr id="16" name="Gruppo 15">
-            <a:extLst>
-              <a:ext uri="{FF2B5EF4-FFF2-40B4-BE49-F238E27FC236}">
-                <a16:creationId xmlns:a16="http://schemas.microsoft.com/office/drawing/2014/main" id="{85D725C4-37FD-4BCB-C4A9-3EB316F52607}"/>
+          <p:cNvPr id="70" name="Gruppo 69">
+            <a:extLst>
+              <a:ext uri="{FF2B5EF4-FFF2-40B4-BE49-F238E27FC236}">
+                <a16:creationId xmlns:a16="http://schemas.microsoft.com/office/drawing/2014/main" id="{2D31ACAB-2EA6-F5FB-B8CC-5BCD503D3C77}"/>
               </a:ext>
             </a:extLst>
           </p:cNvPr>
@@ -4998,18 +5697,18 @@
         </p:nvGrpSpPr>
         <p:grpSpPr>
           <a:xfrm>
-            <a:off x="2714832" y="4859589"/>
-            <a:ext cx="3362959" cy="830997"/>
+            <a:off x="1003464" y="4958669"/>
+            <a:ext cx="3362959" cy="1280405"/>
             <a:chOff x="1701101" y="1802916"/>
             <a:chExt cx="8886021" cy="3784578"/>
           </a:xfrm>
         </p:grpSpPr>
         <p:sp>
           <p:nvSpPr>
-            <p:cNvPr id="17" name="Rettangolo con angoli arrotondati 16">
+            <p:cNvPr id="71" name="Rettangolo con angoli arrotondati 70">
               <a:extLst>
                 <a:ext uri="{FF2B5EF4-FFF2-40B4-BE49-F238E27FC236}">
-                  <a16:creationId xmlns:a16="http://schemas.microsoft.com/office/drawing/2014/main" id="{DE8BF97E-BA59-99F5-1FE2-6CF444C3A763}"/>
+                  <a16:creationId xmlns:a16="http://schemas.microsoft.com/office/drawing/2014/main" id="{837A7229-9D28-0256-387C-D03F33ECD3FF}"/>
                 </a:ext>
               </a:extLst>
             </p:cNvPr>
@@ -5060,397 +5759,10 @@
         </p:sp>
         <p:sp>
           <p:nvSpPr>
-            <p:cNvPr id="18" name="Rettangolo con angoli arrotondati 17">
+            <p:cNvPr id="72" name="Rettangolo con angoli arrotondati 71">
               <a:extLst>
                 <a:ext uri="{FF2B5EF4-FFF2-40B4-BE49-F238E27FC236}">
-                  <a16:creationId xmlns:a16="http://schemas.microsoft.com/office/drawing/2014/main" id="{9B19378F-5B1A-F04E-0834-04702E4077B4}"/>
-                </a:ext>
-              </a:extLst>
-            </p:cNvPr>
-            <p:cNvSpPr/>
-            <p:nvPr/>
-          </p:nvSpPr>
-          <p:spPr>
-            <a:xfrm>
-              <a:off x="1701101" y="1802916"/>
-              <a:ext cx="8789797" cy="3690014"/>
-            </a:xfrm>
-            <a:prstGeom prst="roundRect">
-              <a:avLst/>
-            </a:prstGeom>
-            <a:solidFill>
-              <a:srgbClr val="012F5F"/>
-            </a:solidFill>
-            <a:ln>
-              <a:solidFill>
-                <a:srgbClr val="012F5F"/>
-              </a:solidFill>
-            </a:ln>
-          </p:spPr>
-          <p:style>
-            <a:lnRef idx="2">
-              <a:schemeClr val="accent1">
-                <a:shade val="15000"/>
-              </a:schemeClr>
-            </a:lnRef>
-            <a:fillRef idx="1">
-              <a:schemeClr val="accent1"/>
-            </a:fillRef>
-            <a:effectRef idx="0">
-              <a:schemeClr val="accent1"/>
-            </a:effectRef>
-            <a:fontRef idx="minor">
-              <a:schemeClr val="lt1"/>
-            </a:fontRef>
-          </p:style>
-          <p:txBody>
-            <a:bodyPr rtlCol="0" anchor="ctr"/>
-            <a:lstStyle/>
-            <a:p>
-              <a:pPr algn="ctr"/>
-              <a:endParaRPr lang="it-IT" dirty="0"/>
-            </a:p>
-          </p:txBody>
-        </p:sp>
-      </p:grpSp>
-      <p:grpSp>
-        <p:nvGrpSpPr>
-          <p:cNvPr id="19" name="Gruppo 18">
-            <a:extLst>
-              <a:ext uri="{FF2B5EF4-FFF2-40B4-BE49-F238E27FC236}">
-                <a16:creationId xmlns:a16="http://schemas.microsoft.com/office/drawing/2014/main" id="{AAC35536-4403-D526-AC8D-1D29DD4BA406}"/>
-              </a:ext>
-            </a:extLst>
-          </p:cNvPr>
-          <p:cNvGrpSpPr/>
-          <p:nvPr/>
-        </p:nvGrpSpPr>
-        <p:grpSpPr>
-          <a:xfrm>
-            <a:off x="6337632" y="2723899"/>
-            <a:ext cx="3362959" cy="830997"/>
-            <a:chOff x="1701101" y="1802916"/>
-            <a:chExt cx="8886021" cy="3784578"/>
-          </a:xfrm>
-        </p:grpSpPr>
-        <p:sp>
-          <p:nvSpPr>
-            <p:cNvPr id="20" name="Rettangolo con angoli arrotondati 19">
-              <a:extLst>
-                <a:ext uri="{FF2B5EF4-FFF2-40B4-BE49-F238E27FC236}">
-                  <a16:creationId xmlns:a16="http://schemas.microsoft.com/office/drawing/2014/main" id="{9E0FBA23-C069-5BCF-B4EB-F7FB3DE601A7}"/>
-                </a:ext>
-              </a:extLst>
-            </p:cNvPr>
-            <p:cNvSpPr/>
-            <p:nvPr/>
-          </p:nvSpPr>
-          <p:spPr>
-            <a:xfrm>
-              <a:off x="1797325" y="1897480"/>
-              <a:ext cx="8789797" cy="3690014"/>
-            </a:xfrm>
-            <a:prstGeom prst="roundRect">
-              <a:avLst/>
-            </a:prstGeom>
-            <a:solidFill>
-              <a:schemeClr val="tx1"/>
-            </a:solidFill>
-            <a:ln>
-              <a:solidFill>
-                <a:schemeClr val="tx1"/>
-              </a:solidFill>
-            </a:ln>
-          </p:spPr>
-          <p:style>
-            <a:lnRef idx="2">
-              <a:schemeClr val="accent1">
-                <a:shade val="15000"/>
-              </a:schemeClr>
-            </a:lnRef>
-            <a:fillRef idx="1">
-              <a:schemeClr val="accent1"/>
-            </a:fillRef>
-            <a:effectRef idx="0">
-              <a:schemeClr val="accent1"/>
-            </a:effectRef>
-            <a:fontRef idx="minor">
-              <a:schemeClr val="lt1"/>
-            </a:fontRef>
-          </p:style>
-          <p:txBody>
-            <a:bodyPr rtlCol="0" anchor="ctr"/>
-            <a:lstStyle/>
-            <a:p>
-              <a:pPr algn="ctr"/>
-              <a:endParaRPr lang="it-IT" dirty="0"/>
-            </a:p>
-          </p:txBody>
-        </p:sp>
-        <p:sp>
-          <p:nvSpPr>
-            <p:cNvPr id="21" name="Rettangolo con angoli arrotondati 20">
-              <a:extLst>
-                <a:ext uri="{FF2B5EF4-FFF2-40B4-BE49-F238E27FC236}">
-                  <a16:creationId xmlns:a16="http://schemas.microsoft.com/office/drawing/2014/main" id="{0ADB7800-05D4-426C-6E6E-C61C90EFD435}"/>
-                </a:ext>
-              </a:extLst>
-            </p:cNvPr>
-            <p:cNvSpPr/>
-            <p:nvPr/>
-          </p:nvSpPr>
-          <p:spPr>
-            <a:xfrm>
-              <a:off x="1701101" y="1802916"/>
-              <a:ext cx="8789797" cy="3690014"/>
-            </a:xfrm>
-            <a:prstGeom prst="roundRect">
-              <a:avLst/>
-            </a:prstGeom>
-            <a:solidFill>
-              <a:srgbClr val="012F5F"/>
-            </a:solidFill>
-            <a:ln>
-              <a:solidFill>
-                <a:srgbClr val="012F5F"/>
-              </a:solidFill>
-            </a:ln>
-          </p:spPr>
-          <p:style>
-            <a:lnRef idx="2">
-              <a:schemeClr val="accent1">
-                <a:shade val="15000"/>
-              </a:schemeClr>
-            </a:lnRef>
-            <a:fillRef idx="1">
-              <a:schemeClr val="accent1"/>
-            </a:fillRef>
-            <a:effectRef idx="0">
-              <a:schemeClr val="accent1"/>
-            </a:effectRef>
-            <a:fontRef idx="minor">
-              <a:schemeClr val="lt1"/>
-            </a:fontRef>
-          </p:style>
-          <p:txBody>
-            <a:bodyPr rtlCol="0" anchor="ctr"/>
-            <a:lstStyle/>
-            <a:p>
-              <a:pPr algn="ctr"/>
-              <a:endParaRPr lang="it-IT" dirty="0"/>
-            </a:p>
-          </p:txBody>
-        </p:sp>
-      </p:grpSp>
-      <p:grpSp>
-        <p:nvGrpSpPr>
-          <p:cNvPr id="22" name="Gruppo 21">
-            <a:extLst>
-              <a:ext uri="{FF2B5EF4-FFF2-40B4-BE49-F238E27FC236}">
-                <a16:creationId xmlns:a16="http://schemas.microsoft.com/office/drawing/2014/main" id="{AD169658-51BE-C41E-D7B0-687BDA6E4319}"/>
-              </a:ext>
-            </a:extLst>
-          </p:cNvPr>
-          <p:cNvGrpSpPr/>
-          <p:nvPr/>
-        </p:nvGrpSpPr>
-        <p:grpSpPr>
-          <a:xfrm>
-            <a:off x="6319423" y="3782371"/>
-            <a:ext cx="3362959" cy="830997"/>
-            <a:chOff x="1701101" y="1802916"/>
-            <a:chExt cx="8886021" cy="3784578"/>
-          </a:xfrm>
-        </p:grpSpPr>
-        <p:sp>
-          <p:nvSpPr>
-            <p:cNvPr id="23" name="Rettangolo con angoli arrotondati 22">
-              <a:extLst>
-                <a:ext uri="{FF2B5EF4-FFF2-40B4-BE49-F238E27FC236}">
-                  <a16:creationId xmlns:a16="http://schemas.microsoft.com/office/drawing/2014/main" id="{856D58D9-52D9-F32A-28D5-10E73028109F}"/>
-                </a:ext>
-              </a:extLst>
-            </p:cNvPr>
-            <p:cNvSpPr/>
-            <p:nvPr/>
-          </p:nvSpPr>
-          <p:spPr>
-            <a:xfrm>
-              <a:off x="1797325" y="1897480"/>
-              <a:ext cx="8789797" cy="3690014"/>
-            </a:xfrm>
-            <a:prstGeom prst="roundRect">
-              <a:avLst/>
-            </a:prstGeom>
-            <a:solidFill>
-              <a:schemeClr val="tx1"/>
-            </a:solidFill>
-            <a:ln>
-              <a:solidFill>
-                <a:schemeClr val="tx1"/>
-              </a:solidFill>
-            </a:ln>
-          </p:spPr>
-          <p:style>
-            <a:lnRef idx="2">
-              <a:schemeClr val="accent1">
-                <a:shade val="15000"/>
-              </a:schemeClr>
-            </a:lnRef>
-            <a:fillRef idx="1">
-              <a:schemeClr val="accent1"/>
-            </a:fillRef>
-            <a:effectRef idx="0">
-              <a:schemeClr val="accent1"/>
-            </a:effectRef>
-            <a:fontRef idx="minor">
-              <a:schemeClr val="lt1"/>
-            </a:fontRef>
-          </p:style>
-          <p:txBody>
-            <a:bodyPr rtlCol="0" anchor="ctr"/>
-            <a:lstStyle/>
-            <a:p>
-              <a:pPr algn="ctr"/>
-              <a:endParaRPr lang="it-IT" dirty="0"/>
-            </a:p>
-          </p:txBody>
-        </p:sp>
-        <p:sp>
-          <p:nvSpPr>
-            <p:cNvPr id="24" name="Rettangolo con angoli arrotondati 23">
-              <a:extLst>
-                <a:ext uri="{FF2B5EF4-FFF2-40B4-BE49-F238E27FC236}">
-                  <a16:creationId xmlns:a16="http://schemas.microsoft.com/office/drawing/2014/main" id="{461C0F31-04D6-A1C0-BCEC-86286EBF9CA6}"/>
-                </a:ext>
-              </a:extLst>
-            </p:cNvPr>
-            <p:cNvSpPr/>
-            <p:nvPr/>
-          </p:nvSpPr>
-          <p:spPr>
-            <a:xfrm>
-              <a:off x="1701101" y="1802916"/>
-              <a:ext cx="8789797" cy="3690014"/>
-            </a:xfrm>
-            <a:prstGeom prst="roundRect">
-              <a:avLst/>
-            </a:prstGeom>
-            <a:solidFill>
-              <a:srgbClr val="012F5F"/>
-            </a:solidFill>
-            <a:ln>
-              <a:solidFill>
-                <a:srgbClr val="012F5F"/>
-              </a:solidFill>
-            </a:ln>
-          </p:spPr>
-          <p:style>
-            <a:lnRef idx="2">
-              <a:schemeClr val="accent1">
-                <a:shade val="15000"/>
-              </a:schemeClr>
-            </a:lnRef>
-            <a:fillRef idx="1">
-              <a:schemeClr val="accent1"/>
-            </a:fillRef>
-            <a:effectRef idx="0">
-              <a:schemeClr val="accent1"/>
-            </a:effectRef>
-            <a:fontRef idx="minor">
-              <a:schemeClr val="lt1"/>
-            </a:fontRef>
-          </p:style>
-          <p:txBody>
-            <a:bodyPr rtlCol="0" anchor="ctr"/>
-            <a:lstStyle/>
-            <a:p>
-              <a:pPr algn="ctr"/>
-              <a:endParaRPr lang="it-IT" dirty="0"/>
-            </a:p>
-          </p:txBody>
-        </p:sp>
-      </p:grpSp>
-      <p:grpSp>
-        <p:nvGrpSpPr>
-          <p:cNvPr id="25" name="Gruppo 24">
-            <a:extLst>
-              <a:ext uri="{FF2B5EF4-FFF2-40B4-BE49-F238E27FC236}">
-                <a16:creationId xmlns:a16="http://schemas.microsoft.com/office/drawing/2014/main" id="{B2EAFDBE-CF60-CD4C-BB5C-3AF7029F6700}"/>
-              </a:ext>
-            </a:extLst>
-          </p:cNvPr>
-          <p:cNvGrpSpPr/>
-          <p:nvPr/>
-        </p:nvGrpSpPr>
-        <p:grpSpPr>
-          <a:xfrm>
-            <a:off x="6319423" y="4859589"/>
-            <a:ext cx="3362959" cy="830997"/>
-            <a:chOff x="1701101" y="1802916"/>
-            <a:chExt cx="8886021" cy="3784578"/>
-          </a:xfrm>
-        </p:grpSpPr>
-        <p:sp>
-          <p:nvSpPr>
-            <p:cNvPr id="26" name="Rettangolo con angoli arrotondati 25">
-              <a:extLst>
-                <a:ext uri="{FF2B5EF4-FFF2-40B4-BE49-F238E27FC236}">
-                  <a16:creationId xmlns:a16="http://schemas.microsoft.com/office/drawing/2014/main" id="{C1C88557-10A4-A7C6-E951-903B6929E13E}"/>
-                </a:ext>
-              </a:extLst>
-            </p:cNvPr>
-            <p:cNvSpPr/>
-            <p:nvPr/>
-          </p:nvSpPr>
-          <p:spPr>
-            <a:xfrm>
-              <a:off x="1797325" y="1897480"/>
-              <a:ext cx="8789797" cy="3690014"/>
-            </a:xfrm>
-            <a:prstGeom prst="roundRect">
-              <a:avLst/>
-            </a:prstGeom>
-            <a:solidFill>
-              <a:schemeClr val="tx1"/>
-            </a:solidFill>
-            <a:ln>
-              <a:solidFill>
-                <a:schemeClr val="tx1"/>
-              </a:solidFill>
-            </a:ln>
-          </p:spPr>
-          <p:style>
-            <a:lnRef idx="2">
-              <a:schemeClr val="accent1">
-                <a:shade val="15000"/>
-              </a:schemeClr>
-            </a:lnRef>
-            <a:fillRef idx="1">
-              <a:schemeClr val="accent1"/>
-            </a:fillRef>
-            <a:effectRef idx="0">
-              <a:schemeClr val="accent1"/>
-            </a:effectRef>
-            <a:fontRef idx="minor">
-              <a:schemeClr val="lt1"/>
-            </a:fontRef>
-          </p:style>
-          <p:txBody>
-            <a:bodyPr rtlCol="0" anchor="ctr"/>
-            <a:lstStyle/>
-            <a:p>
-              <a:pPr algn="ctr"/>
-              <a:endParaRPr lang="it-IT" dirty="0"/>
-            </a:p>
-          </p:txBody>
-        </p:sp>
-        <p:sp>
-          <p:nvSpPr>
-            <p:cNvPr id="27" name="Rettangolo con angoli arrotondati 26">
-              <a:extLst>
-                <a:ext uri="{FF2B5EF4-FFF2-40B4-BE49-F238E27FC236}">
-                  <a16:creationId xmlns:a16="http://schemas.microsoft.com/office/drawing/2014/main" id="{C96ECB36-072B-E814-DBD5-7B1B340EED31}"/>
+                  <a16:creationId xmlns:a16="http://schemas.microsoft.com/office/drawing/2014/main" id="{FE56195E-8937-6D8A-21DF-33E32BFD2A90}"/>
                 </a:ext>
               </a:extLst>
             </p:cNvPr>
@@ -5502,10 +5814,10 @@
       </p:grpSp>
       <p:sp>
         <p:nvSpPr>
-          <p:cNvPr id="28" name="CasellaDiTesto 27">
-            <a:extLst>
-              <a:ext uri="{FF2B5EF4-FFF2-40B4-BE49-F238E27FC236}">
-                <a16:creationId xmlns:a16="http://schemas.microsoft.com/office/drawing/2014/main" id="{9E20CD36-22B1-4EF0-D2AF-43A4479ADFEC}"/>
+          <p:cNvPr id="73" name="CasellaDiTesto 72">
+            <a:extLst>
+              <a:ext uri="{FF2B5EF4-FFF2-40B4-BE49-F238E27FC236}">
+                <a16:creationId xmlns:a16="http://schemas.microsoft.com/office/drawing/2014/main" id="{BB54AF6B-E5BC-683B-5823-243265563479}"/>
               </a:ext>
             </a:extLst>
           </p:cNvPr>
@@ -5514,8 +5826,8 @@
         </p:nvSpPr>
         <p:spPr>
           <a:xfrm>
-            <a:off x="2714832" y="2944349"/>
-            <a:ext cx="3344752" cy="369332"/>
+            <a:off x="1003464" y="2218587"/>
+            <a:ext cx="3362959" cy="369332"/>
           </a:xfrm>
           <a:prstGeom prst="rect">
             <a:avLst/>
@@ -5535,17 +5847,30 @@
                   <a:schemeClr val="bg1"/>
                 </a:solidFill>
               </a:rPr>
-              <a:t>Real-time Detection</a:t>
-            </a:r>
+              <a:t>Real-time </a:t>
+            </a:r>
+            <a:r>
+              <a:rPr lang="it-IT" b="1" dirty="0" err="1">
+                <a:solidFill>
+                  <a:schemeClr val="bg1"/>
+                </a:solidFill>
+              </a:rPr>
+              <a:t>Detection</a:t>
+            </a:r>
+            <a:endParaRPr lang="it-IT" b="1" dirty="0">
+              <a:solidFill>
+                <a:schemeClr val="bg1"/>
+              </a:solidFill>
+            </a:endParaRPr>
           </a:p>
         </p:txBody>
       </p:sp>
       <p:sp>
         <p:nvSpPr>
-          <p:cNvPr id="29" name="CasellaDiTesto 28">
-            <a:extLst>
-              <a:ext uri="{FF2B5EF4-FFF2-40B4-BE49-F238E27FC236}">
-                <a16:creationId xmlns:a16="http://schemas.microsoft.com/office/drawing/2014/main" id="{58D980DA-F142-9270-72AC-F41B08037022}"/>
+          <p:cNvPr id="74" name="CasellaDiTesto 73">
+            <a:extLst>
+              <a:ext uri="{FF2B5EF4-FFF2-40B4-BE49-F238E27FC236}">
+                <a16:creationId xmlns:a16="http://schemas.microsoft.com/office/drawing/2014/main" id="{4C2814E7-A92F-2C1E-299D-B14BBE3E4D9F}"/>
               </a:ext>
             </a:extLst>
           </p:cNvPr>
@@ -5554,7 +5879,7 @@
         </p:nvSpPr>
         <p:spPr>
           <a:xfrm>
-            <a:off x="6319423" y="2944349"/>
+            <a:off x="1003464" y="5007859"/>
             <a:ext cx="3362959" cy="369332"/>
           </a:xfrm>
           <a:prstGeom prst="rect">
@@ -5570,22 +5895,30 @@
           <a:p>
             <a:pPr algn="ctr"/>
             <a:r>
+              <a:rPr lang="it-IT" b="1" dirty="0" err="1">
+                <a:solidFill>
+                  <a:schemeClr val="bg1"/>
+                </a:solidFill>
+              </a:rPr>
+              <a:t>Splunk</a:t>
+            </a:r>
+            <a:r>
               <a:rPr lang="it-IT" b="1" dirty="0">
                 <a:solidFill>
                   <a:schemeClr val="bg1"/>
                 </a:solidFill>
               </a:rPr>
-              <a:t>Comprehensive Analysis</a:t>
+              <a:t> MLTK Integration</a:t>
             </a:r>
           </a:p>
         </p:txBody>
       </p:sp>
       <p:sp>
         <p:nvSpPr>
-          <p:cNvPr id="30" name="CasellaDiTesto 29">
-            <a:extLst>
-              <a:ext uri="{FF2B5EF4-FFF2-40B4-BE49-F238E27FC236}">
-                <a16:creationId xmlns:a16="http://schemas.microsoft.com/office/drawing/2014/main" id="{EDCF43C8-9D87-79F4-3C0C-21B7D7AEF429}"/>
+          <p:cNvPr id="75" name="CasellaDiTesto 74">
+            <a:extLst>
+              <a:ext uri="{FF2B5EF4-FFF2-40B4-BE49-F238E27FC236}">
+                <a16:creationId xmlns:a16="http://schemas.microsoft.com/office/drawing/2014/main" id="{B9E9472E-FE87-2CE7-F1F7-CEFB05F20671}"/>
               </a:ext>
             </a:extLst>
           </p:cNvPr>
@@ -5594,8 +5927,8 @@
         </p:nvSpPr>
         <p:spPr>
           <a:xfrm>
-            <a:off x="2714832" y="3982440"/>
-            <a:ext cx="3344752" cy="369332"/>
+            <a:off x="1501391" y="2644850"/>
+            <a:ext cx="2330686" cy="646331"/>
           </a:xfrm>
           <a:prstGeom prst="rect">
             <a:avLst/>
@@ -5610,22 +5943,29 @@
           <a:p>
             <a:pPr algn="ctr"/>
             <a:r>
-              <a:rPr lang="it-IT" b="1" dirty="0">
+              <a:rPr lang="en-US" sz="1200" b="0" i="0" dirty="0">
                 <a:solidFill>
-                  <a:schemeClr val="bg1"/>
+                  <a:srgbClr val="F0F6FC"/>
                 </a:solidFill>
+                <a:effectLst/>
+                <a:latin typeface="-apple-system"/>
               </a:rPr>
-              <a:t>Splunk MLTK Integration</a:t>
-            </a:r>
+              <a:t>Continuous monitoring of DNS traffic for immediate threat identification</a:t>
+            </a:r>
+            <a:endParaRPr lang="it-IT" sz="1200" dirty="0">
+              <a:solidFill>
+                <a:schemeClr val="bg1"/>
+              </a:solidFill>
+            </a:endParaRPr>
           </a:p>
         </p:txBody>
       </p:sp>
       <p:sp>
         <p:nvSpPr>
-          <p:cNvPr id="31" name="CasellaDiTesto 30">
-            <a:extLst>
-              <a:ext uri="{FF2B5EF4-FFF2-40B4-BE49-F238E27FC236}">
-                <a16:creationId xmlns:a16="http://schemas.microsoft.com/office/drawing/2014/main" id="{49EA0B01-CF93-B8B9-AC72-8F26F38F6CCF}"/>
+          <p:cNvPr id="76" name="CasellaDiTesto 75">
+            <a:extLst>
+              <a:ext uri="{FF2B5EF4-FFF2-40B4-BE49-F238E27FC236}">
+                <a16:creationId xmlns:a16="http://schemas.microsoft.com/office/drawing/2014/main" id="{F6A92CEC-1BEB-A208-3AA1-C5972DC12C91}"/>
               </a:ext>
             </a:extLst>
           </p:cNvPr>
@@ -5634,8 +5974,8 @@
         </p:nvSpPr>
         <p:spPr>
           <a:xfrm>
-            <a:off x="6319423" y="3982440"/>
-            <a:ext cx="3362959" cy="369332"/>
+            <a:off x="1337833" y="5508264"/>
+            <a:ext cx="2644817" cy="461665"/>
           </a:xfrm>
           <a:prstGeom prst="rect">
             <a:avLst/>
@@ -5650,22 +5990,158 @@
           <a:p>
             <a:pPr algn="ctr"/>
             <a:r>
-              <a:rPr lang="it-IT" b="1" dirty="0">
+              <a:rPr lang="en-US" sz="1200" b="0" i="0" dirty="0">
                 <a:solidFill>
-                  <a:schemeClr val="bg1"/>
+                  <a:srgbClr val="F0F6FC"/>
                 </a:solidFill>
+                <a:effectLst/>
+                <a:latin typeface="-apple-system"/>
               </a:rPr>
-              <a:t>Enterprise-Ready</a:t>
-            </a:r>
+              <a:t>Advanced algorithms for pattern recognition and anomaly detection</a:t>
+            </a:r>
+            <a:endParaRPr lang="it-IT" sz="1200" dirty="0">
+              <a:solidFill>
+                <a:schemeClr val="bg1"/>
+              </a:solidFill>
+            </a:endParaRPr>
           </a:p>
         </p:txBody>
       </p:sp>
+      <p:grpSp>
+        <p:nvGrpSpPr>
+          <p:cNvPr id="77" name="Gruppo 76">
+            <a:extLst>
+              <a:ext uri="{FF2B5EF4-FFF2-40B4-BE49-F238E27FC236}">
+                <a16:creationId xmlns:a16="http://schemas.microsoft.com/office/drawing/2014/main" id="{328226F1-2C29-59CC-1D9D-52C327CCD54D}"/>
+              </a:ext>
+            </a:extLst>
+          </p:cNvPr>
+          <p:cNvGrpSpPr/>
+          <p:nvPr/>
+        </p:nvGrpSpPr>
+        <p:grpSpPr>
+          <a:xfrm>
+            <a:off x="1003464" y="3546371"/>
+            <a:ext cx="3362959" cy="1313218"/>
+            <a:chOff x="1701101" y="1802916"/>
+            <a:chExt cx="8886021" cy="3784578"/>
+          </a:xfrm>
+        </p:grpSpPr>
+        <p:sp>
+          <p:nvSpPr>
+            <p:cNvPr id="78" name="Rettangolo con angoli arrotondati 77">
+              <a:extLst>
+                <a:ext uri="{FF2B5EF4-FFF2-40B4-BE49-F238E27FC236}">
+                  <a16:creationId xmlns:a16="http://schemas.microsoft.com/office/drawing/2014/main" id="{B8549DC8-5391-7B7F-5F4A-FE71BE4005FA}"/>
+                </a:ext>
+              </a:extLst>
+            </p:cNvPr>
+            <p:cNvSpPr/>
+            <p:nvPr/>
+          </p:nvSpPr>
+          <p:spPr>
+            <a:xfrm>
+              <a:off x="1797325" y="1897480"/>
+              <a:ext cx="8789797" cy="3690014"/>
+            </a:xfrm>
+            <a:prstGeom prst="roundRect">
+              <a:avLst/>
+            </a:prstGeom>
+            <a:solidFill>
+              <a:schemeClr val="tx1"/>
+            </a:solidFill>
+            <a:ln>
+              <a:solidFill>
+                <a:schemeClr val="tx1"/>
+              </a:solidFill>
+            </a:ln>
+          </p:spPr>
+          <p:style>
+            <a:lnRef idx="2">
+              <a:schemeClr val="accent1">
+                <a:shade val="15000"/>
+              </a:schemeClr>
+            </a:lnRef>
+            <a:fillRef idx="1">
+              <a:schemeClr val="accent1"/>
+            </a:fillRef>
+            <a:effectRef idx="0">
+              <a:schemeClr val="accent1"/>
+            </a:effectRef>
+            <a:fontRef idx="minor">
+              <a:schemeClr val="lt1"/>
+            </a:fontRef>
+          </p:style>
+          <p:txBody>
+            <a:bodyPr rtlCol="0" anchor="ctr"/>
+            <a:lstStyle/>
+            <a:p>
+              <a:pPr algn="ctr"/>
+              <a:endParaRPr lang="it-IT" dirty="0"/>
+            </a:p>
+          </p:txBody>
+        </p:sp>
+        <p:sp>
+          <p:nvSpPr>
+            <p:cNvPr id="79" name="Rettangolo con angoli arrotondati 78">
+              <a:extLst>
+                <a:ext uri="{FF2B5EF4-FFF2-40B4-BE49-F238E27FC236}">
+                  <a16:creationId xmlns:a16="http://schemas.microsoft.com/office/drawing/2014/main" id="{A0512D8B-D0A4-AE74-AB68-A2D441C70916}"/>
+                </a:ext>
+              </a:extLst>
+            </p:cNvPr>
+            <p:cNvSpPr/>
+            <p:nvPr/>
+          </p:nvSpPr>
+          <p:spPr>
+            <a:xfrm>
+              <a:off x="1701101" y="1802916"/>
+              <a:ext cx="8789797" cy="3690014"/>
+            </a:xfrm>
+            <a:prstGeom prst="roundRect">
+              <a:avLst/>
+            </a:prstGeom>
+            <a:solidFill>
+              <a:srgbClr val="012F5F"/>
+            </a:solidFill>
+            <a:ln>
+              <a:solidFill>
+                <a:srgbClr val="012F5F"/>
+              </a:solidFill>
+            </a:ln>
+          </p:spPr>
+          <p:style>
+            <a:lnRef idx="2">
+              <a:schemeClr val="accent1">
+                <a:shade val="15000"/>
+              </a:schemeClr>
+            </a:lnRef>
+            <a:fillRef idx="1">
+              <a:schemeClr val="accent1"/>
+            </a:fillRef>
+            <a:effectRef idx="0">
+              <a:schemeClr val="accent1"/>
+            </a:effectRef>
+            <a:fontRef idx="minor">
+              <a:schemeClr val="lt1"/>
+            </a:fontRef>
+          </p:style>
+          <p:txBody>
+            <a:bodyPr rtlCol="0" anchor="ctr"/>
+            <a:lstStyle/>
+            <a:p>
+              <a:pPr algn="ctr"/>
+              <a:endParaRPr lang="it-IT" dirty="0"/>
+            </a:p>
+          </p:txBody>
+        </p:sp>
+      </p:grpSp>
       <p:sp>
         <p:nvSpPr>
-          <p:cNvPr id="32" name="CasellaDiTesto 31">
-            <a:extLst>
-              <a:ext uri="{FF2B5EF4-FFF2-40B4-BE49-F238E27FC236}">
-                <a16:creationId xmlns:a16="http://schemas.microsoft.com/office/drawing/2014/main" id="{6F926018-CEBA-8F6D-1ACD-8668A33DE62E}"/>
+          <p:cNvPr id="80" name="CasellaDiTesto 79">
+            <a:extLst>
+              <a:ext uri="{FF2B5EF4-FFF2-40B4-BE49-F238E27FC236}">
+                <a16:creationId xmlns:a16="http://schemas.microsoft.com/office/drawing/2014/main" id="{0966BEEF-CCE7-920E-00D4-22053BC5BB58}"/>
               </a:ext>
             </a:extLst>
           </p:cNvPr>
@@ -5674,8 +6150,8 @@
         </p:nvSpPr>
         <p:spPr>
           <a:xfrm>
-            <a:off x="2714832" y="5061294"/>
-            <a:ext cx="3344752" cy="369332"/>
+            <a:off x="1003464" y="3630343"/>
+            <a:ext cx="3362959" cy="369332"/>
           </a:xfrm>
           <a:prstGeom prst="rect">
             <a:avLst/>
@@ -5695,17 +6171,17 @@
                   <a:schemeClr val="bg1"/>
                 </a:solidFill>
               </a:rPr>
-              <a:t>CIM Compliance</a:t>
+              <a:t>Comprehensive Analysis</a:t>
             </a:r>
           </a:p>
         </p:txBody>
       </p:sp>
       <p:sp>
         <p:nvSpPr>
-          <p:cNvPr id="33" name="CasellaDiTesto 32">
-            <a:extLst>
-              <a:ext uri="{FF2B5EF4-FFF2-40B4-BE49-F238E27FC236}">
-                <a16:creationId xmlns:a16="http://schemas.microsoft.com/office/drawing/2014/main" id="{63250FE8-1C71-B36F-A183-06E04EB029AD}"/>
+          <p:cNvPr id="81" name="CasellaDiTesto 80">
+            <a:extLst>
+              <a:ext uri="{FF2B5EF4-FFF2-40B4-BE49-F238E27FC236}">
+                <a16:creationId xmlns:a16="http://schemas.microsoft.com/office/drawing/2014/main" id="{FAF683FE-822A-F49D-B59D-624619A167DE}"/>
               </a:ext>
             </a:extLst>
           </p:cNvPr>
@@ -5714,8 +6190,8 @@
         </p:nvSpPr>
         <p:spPr>
           <a:xfrm>
-            <a:off x="6319423" y="5061294"/>
-            <a:ext cx="3362959" cy="369332"/>
+            <a:off x="1501391" y="4043890"/>
+            <a:ext cx="2330686" cy="646331"/>
           </a:xfrm>
           <a:prstGeom prst="rect">
             <a:avLst/>
@@ -5730,12 +6206,152 @@
           <a:p>
             <a:pPr algn="ctr"/>
             <a:r>
-              <a:rPr lang="it-IT" b="1" dirty="0">
+              <a:rPr lang="en-US" sz="1200" b="0" i="0" dirty="0">
+                <a:solidFill>
+                  <a:srgbClr val="F0F6FC"/>
+                </a:solidFill>
+                <a:effectLst/>
+                <a:latin typeface="-apple-system"/>
+              </a:rPr>
+              <a:t>Multiple detection methods working in concert to identify various types of threats</a:t>
+            </a:r>
+            <a:endParaRPr lang="it-IT" sz="1200" dirty="0">
+              <a:solidFill>
+                <a:schemeClr val="bg1"/>
+              </a:solidFill>
+            </a:endParaRPr>
+          </a:p>
+        </p:txBody>
+      </p:sp>
+      <p:cxnSp>
+        <p:nvCxnSpPr>
+          <p:cNvPr id="82" name="Connettore a gomito 81">
+            <a:extLst>
+              <a:ext uri="{FF2B5EF4-FFF2-40B4-BE49-F238E27FC236}">
+                <a16:creationId xmlns:a16="http://schemas.microsoft.com/office/drawing/2014/main" id="{53741F7C-7E94-959F-3AEC-845246D949CE}"/>
+              </a:ext>
+            </a:extLst>
+          </p:cNvPr>
+          <p:cNvCxnSpPr>
+            <a:cxnSpLocks/>
+            <a:endCxn id="68" idx="3"/>
+          </p:cNvCxnSpPr>
+          <p:nvPr/>
+        </p:nvCxnSpPr>
+        <p:spPr>
+          <a:xfrm rot="10800000">
+            <a:off x="4366423" y="2807632"/>
+            <a:ext cx="658260" cy="1319875"/>
+          </a:xfrm>
+          <a:prstGeom prst="bentConnector3">
+            <a:avLst>
+              <a:gd name="adj1" fmla="val 50000"/>
+            </a:avLst>
+          </a:prstGeom>
+          <a:ln>
+            <a:solidFill>
+              <a:schemeClr val="bg1"/>
+            </a:solidFill>
+            <a:tailEnd type="triangle"/>
+          </a:ln>
+        </p:spPr>
+        <p:style>
+          <a:lnRef idx="2">
+            <a:schemeClr val="accent1"/>
+          </a:lnRef>
+          <a:fillRef idx="0">
+            <a:schemeClr val="accent1"/>
+          </a:fillRef>
+          <a:effectRef idx="1">
+            <a:schemeClr val="accent1"/>
+          </a:effectRef>
+          <a:fontRef idx="minor">
+            <a:schemeClr val="tx1"/>
+          </a:fontRef>
+        </p:style>
+      </p:cxnSp>
+      <p:cxnSp>
+        <p:nvCxnSpPr>
+          <p:cNvPr id="85" name="Connettore a gomito 84">
+            <a:extLst>
+              <a:ext uri="{FF2B5EF4-FFF2-40B4-BE49-F238E27FC236}">
+                <a16:creationId xmlns:a16="http://schemas.microsoft.com/office/drawing/2014/main" id="{48656BBA-9E64-0CD4-A579-40993706342E}"/>
+              </a:ext>
+            </a:extLst>
+          </p:cNvPr>
+          <p:cNvCxnSpPr>
+            <a:cxnSpLocks/>
+            <a:endCxn id="71" idx="3"/>
+          </p:cNvCxnSpPr>
+          <p:nvPr/>
+        </p:nvCxnSpPr>
+        <p:spPr>
+          <a:xfrm rot="10800000" flipV="1">
+            <a:off x="4366423" y="4127506"/>
+            <a:ext cx="658260" cy="1487362"/>
+          </a:xfrm>
+          <a:prstGeom prst="bentConnector3">
+            <a:avLst>
+              <a:gd name="adj1" fmla="val 50000"/>
+            </a:avLst>
+          </a:prstGeom>
+          <a:ln>
+            <a:solidFill>
+              <a:schemeClr val="bg1"/>
+            </a:solidFill>
+            <a:tailEnd type="triangle"/>
+          </a:ln>
+        </p:spPr>
+        <p:style>
+          <a:lnRef idx="2">
+            <a:schemeClr val="accent1"/>
+          </a:lnRef>
+          <a:fillRef idx="0">
+            <a:schemeClr val="accent1"/>
+          </a:fillRef>
+          <a:effectRef idx="1">
+            <a:schemeClr val="accent1"/>
+          </a:effectRef>
+          <a:fontRef idx="minor">
+            <a:schemeClr val="tx1"/>
+          </a:fontRef>
+        </p:style>
+      </p:cxnSp>
+      <p:sp>
+        <p:nvSpPr>
+          <p:cNvPr id="88" name="CasellaDiTesto 87">
+            <a:extLst>
+              <a:ext uri="{FF2B5EF4-FFF2-40B4-BE49-F238E27FC236}">
+                <a16:creationId xmlns:a16="http://schemas.microsoft.com/office/drawing/2014/main" id="{26E0DEE2-FA2C-1C90-345E-CB4B69866F42}"/>
+              </a:ext>
+            </a:extLst>
+          </p:cNvPr>
+          <p:cNvSpPr txBox="1"/>
+          <p:nvPr/>
+        </p:nvSpPr>
+        <p:spPr>
+          <a:xfrm>
+            <a:off x="5235813" y="5415150"/>
+            <a:ext cx="1931506" cy="461665"/>
+          </a:xfrm>
+          <a:prstGeom prst="rect">
+            <a:avLst/>
+          </a:prstGeom>
+          <a:noFill/>
+        </p:spPr>
+        <p:txBody>
+          <a:bodyPr wrap="square" rtlCol="0">
+            <a:spAutoFit/>
+          </a:bodyPr>
+          <a:lstStyle/>
+          <a:p>
+            <a:r>
+              <a:rPr lang="it-IT" sz="2400" b="1" spc="-150" dirty="0">
                 <a:solidFill>
                   <a:schemeClr val="bg1"/>
                 </a:solidFill>
               </a:rPr>
-              <a:t>Dashboard System</a:t>
+              <a:t>DNS Guard AI</a:t>
             </a:r>
           </a:p>
         </p:txBody>

</xml_diff>

<commit_message>
feat(IDEA): pdf & ppt files updated
</commit_message>
<xml_diff>
--- a/Splunk-Build-A-Thon-Idea/Splunk-DNSGuard-AI-IDEA.pptx
+++ b/Splunk-Build-A-Thon-Idea/Splunk-DNSGuard-AI-IDEA.pptx
@@ -205,7 +205,7 @@
           <a:p>
             <a:fld id="{07B3BC97-3BC0-40FA-81A1-72ED287ACE70}" type="datetimeFigureOut">
               <a:rPr lang="it-IT" smtClean="0"/>
-              <a:t>18/05/2025</a:t>
+              <a:t>20/05/2025</a:t>
             </a:fld>
             <a:endParaRPr lang="it-IT" dirty="0"/>
           </a:p>
@@ -703,7 +703,7 @@
           <a:p>
             <a:fld id="{C94D923A-9170-4643-B378-C6ADCBE8E107}" type="datetimeFigureOut">
               <a:rPr lang="it-IT" smtClean="0"/>
-              <a:t>18/05/2025</a:t>
+              <a:t>20/05/2025</a:t>
             </a:fld>
             <a:endParaRPr lang="it-IT" dirty="0"/>
           </a:p>
@@ -901,7 +901,7 @@
           <a:p>
             <a:fld id="{C94D923A-9170-4643-B378-C6ADCBE8E107}" type="datetimeFigureOut">
               <a:rPr lang="it-IT" smtClean="0"/>
-              <a:t>18/05/2025</a:t>
+              <a:t>20/05/2025</a:t>
             </a:fld>
             <a:endParaRPr lang="it-IT" dirty="0"/>
           </a:p>
@@ -1109,7 +1109,7 @@
           <a:p>
             <a:fld id="{C94D923A-9170-4643-B378-C6ADCBE8E107}" type="datetimeFigureOut">
               <a:rPr lang="it-IT" smtClean="0"/>
-              <a:t>18/05/2025</a:t>
+              <a:t>20/05/2025</a:t>
             </a:fld>
             <a:endParaRPr lang="it-IT" dirty="0"/>
           </a:p>
@@ -1307,7 +1307,7 @@
           <a:p>
             <a:fld id="{C94D923A-9170-4643-B378-C6ADCBE8E107}" type="datetimeFigureOut">
               <a:rPr lang="it-IT" smtClean="0"/>
-              <a:t>18/05/2025</a:t>
+              <a:t>20/05/2025</a:t>
             </a:fld>
             <a:endParaRPr lang="it-IT" dirty="0"/>
           </a:p>
@@ -1582,7 +1582,7 @@
           <a:p>
             <a:fld id="{C94D923A-9170-4643-B378-C6ADCBE8E107}" type="datetimeFigureOut">
               <a:rPr lang="it-IT" smtClean="0"/>
-              <a:t>18/05/2025</a:t>
+              <a:t>20/05/2025</a:t>
             </a:fld>
             <a:endParaRPr lang="it-IT" dirty="0"/>
           </a:p>
@@ -1847,7 +1847,7 @@
           <a:p>
             <a:fld id="{C94D923A-9170-4643-B378-C6ADCBE8E107}" type="datetimeFigureOut">
               <a:rPr lang="it-IT" smtClean="0"/>
-              <a:t>18/05/2025</a:t>
+              <a:t>20/05/2025</a:t>
             </a:fld>
             <a:endParaRPr lang="it-IT" dirty="0"/>
           </a:p>
@@ -2259,7 +2259,7 @@
           <a:p>
             <a:fld id="{C94D923A-9170-4643-B378-C6ADCBE8E107}" type="datetimeFigureOut">
               <a:rPr lang="it-IT" smtClean="0"/>
-              <a:t>18/05/2025</a:t>
+              <a:t>20/05/2025</a:t>
             </a:fld>
             <a:endParaRPr lang="it-IT" dirty="0"/>
           </a:p>
@@ -2400,7 +2400,7 @@
           <a:p>
             <a:fld id="{C94D923A-9170-4643-B378-C6ADCBE8E107}" type="datetimeFigureOut">
               <a:rPr lang="it-IT" smtClean="0"/>
-              <a:t>18/05/2025</a:t>
+              <a:t>20/05/2025</a:t>
             </a:fld>
             <a:endParaRPr lang="it-IT" dirty="0"/>
           </a:p>
@@ -2513,7 +2513,7 @@
           <a:p>
             <a:fld id="{C94D923A-9170-4643-B378-C6ADCBE8E107}" type="datetimeFigureOut">
               <a:rPr lang="it-IT" smtClean="0"/>
-              <a:t>18/05/2025</a:t>
+              <a:t>20/05/2025</a:t>
             </a:fld>
             <a:endParaRPr lang="it-IT" dirty="0"/>
           </a:p>
@@ -2824,7 +2824,7 @@
           <a:p>
             <a:fld id="{C94D923A-9170-4643-B378-C6ADCBE8E107}" type="datetimeFigureOut">
               <a:rPr lang="it-IT" smtClean="0"/>
-              <a:t>18/05/2025</a:t>
+              <a:t>20/05/2025</a:t>
             </a:fld>
             <a:endParaRPr lang="it-IT" dirty="0"/>
           </a:p>
@@ -3112,7 +3112,7 @@
           <a:p>
             <a:fld id="{C94D923A-9170-4643-B378-C6ADCBE8E107}" type="datetimeFigureOut">
               <a:rPr lang="it-IT" smtClean="0"/>
-              <a:t>18/05/2025</a:t>
+              <a:t>20/05/2025</a:t>
             </a:fld>
             <a:endParaRPr lang="it-IT" dirty="0"/>
           </a:p>
@@ -3353,7 +3353,7 @@
           <a:p>
             <a:fld id="{C94D923A-9170-4643-B378-C6ADCBE8E107}" type="datetimeFigureOut">
               <a:rPr lang="it-IT" smtClean="0"/>
-              <a:t>18/05/2025</a:t>
+              <a:t>20/05/2025</a:t>
             </a:fld>
             <a:endParaRPr lang="it-IT" dirty="0"/>
           </a:p>
@@ -5137,57 +5137,7 @@
                 <a:effectLst/>
                 <a:latin typeface="-apple-system"/>
               </a:rPr>
-              <a:t>Scalable </a:t>
-            </a:r>
-            <a:r>
-              <a:rPr lang="it-IT" sz="1200" b="0" i="0" dirty="0" err="1">
-                <a:solidFill>
-                  <a:srgbClr val="F0F6FC"/>
-                </a:solidFill>
-                <a:effectLst/>
-                <a:latin typeface="-apple-system"/>
-              </a:rPr>
-              <a:t>solution</a:t>
-            </a:r>
-            <a:r>
-              <a:rPr lang="it-IT" sz="1200" b="0" i="0" dirty="0">
-                <a:solidFill>
-                  <a:srgbClr val="F0F6FC"/>
-                </a:solidFill>
-                <a:effectLst/>
-                <a:latin typeface="-apple-system"/>
-              </a:rPr>
-              <a:t> </a:t>
-            </a:r>
-            <a:r>
-              <a:rPr lang="it-IT" sz="1200" b="0" i="0" dirty="0" err="1">
-                <a:solidFill>
-                  <a:srgbClr val="F0F6FC"/>
-                </a:solidFill>
-                <a:effectLst/>
-                <a:latin typeface="-apple-system"/>
-              </a:rPr>
-              <a:t>designed</a:t>
-            </a:r>
-            <a:r>
-              <a:rPr lang="it-IT" sz="1200" b="0" i="0" dirty="0">
-                <a:solidFill>
-                  <a:srgbClr val="F0F6FC"/>
-                </a:solidFill>
-                <a:effectLst/>
-                <a:latin typeface="-apple-system"/>
-              </a:rPr>
-              <a:t> for large network </a:t>
-            </a:r>
-            <a:r>
-              <a:rPr lang="it-IT" sz="1200" b="0" i="0" dirty="0" err="1">
-                <a:solidFill>
-                  <a:srgbClr val="F0F6FC"/>
-                </a:solidFill>
-                <a:effectLst/>
-                <a:latin typeface="-apple-system"/>
-              </a:rPr>
-              <a:t>environments</a:t>
+              <a:t>Scalable solution designed for large network environments</a:t>
             </a:r>
             <a:endParaRPr lang="it-IT" sz="1200" dirty="0">
               <a:solidFill>
@@ -5847,21 +5797,8 @@
                   <a:schemeClr val="bg1"/>
                 </a:solidFill>
               </a:rPr>
-              <a:t>Real-time </a:t>
-            </a:r>
-            <a:r>
-              <a:rPr lang="it-IT" b="1" dirty="0" err="1">
-                <a:solidFill>
-                  <a:schemeClr val="bg1"/>
-                </a:solidFill>
-              </a:rPr>
-              <a:t>Detection</a:t>
-            </a:r>
-            <a:endParaRPr lang="it-IT" b="1" dirty="0">
-              <a:solidFill>
-                <a:schemeClr val="bg1"/>
-              </a:solidFill>
-            </a:endParaRPr>
+              <a:t>Real-time Detection</a:t>
+            </a:r>
           </a:p>
         </p:txBody>
       </p:sp>
@@ -5895,20 +5832,12 @@
           <a:p>
             <a:pPr algn="ctr"/>
             <a:r>
-              <a:rPr lang="it-IT" b="1" dirty="0" err="1">
-                <a:solidFill>
-                  <a:schemeClr val="bg1"/>
-                </a:solidFill>
-              </a:rPr>
-              <a:t>Splunk</a:t>
-            </a:r>
-            <a:r>
               <a:rPr lang="it-IT" b="1" dirty="0">
                 <a:solidFill>
                   <a:schemeClr val="bg1"/>
                 </a:solidFill>
               </a:rPr>
-              <a:t> MLTK Integration</a:t>
+              <a:t>Splunk MLTK Integration</a:t>
             </a:r>
           </a:p>
         </p:txBody>
@@ -12036,21 +11965,8 @@
                   <a:schemeClr val="bg1"/>
                 </a:solidFill>
               </a:rPr>
-              <a:t>Management </a:t>
-            </a:r>
-            <a:r>
-              <a:rPr lang="it-IT" b="1" dirty="0" err="1">
-                <a:solidFill>
-                  <a:schemeClr val="bg1"/>
-                </a:solidFill>
-              </a:rPr>
-              <a:t>View</a:t>
-            </a:r>
-            <a:endParaRPr lang="it-IT" b="1" dirty="0">
-              <a:solidFill>
-                <a:schemeClr val="bg1"/>
-              </a:solidFill>
-            </a:endParaRPr>
+              <a:t>Management View</a:t>
+            </a:r>
           </a:p>
         </p:txBody>
       </p:sp>
@@ -12601,21 +12517,8 @@
                   <a:schemeClr val="bg1"/>
                 </a:solidFill>
               </a:rPr>
-              <a:t>Dashboards </a:t>
-            </a:r>
-            <a:r>
-              <a:rPr lang="it-IT" b="1" dirty="0" err="1">
-                <a:solidFill>
-                  <a:schemeClr val="bg1"/>
-                </a:solidFill>
-              </a:rPr>
-              <a:t>View</a:t>
-            </a:r>
-            <a:endParaRPr lang="it-IT" b="1" dirty="0">
-              <a:solidFill>
-                <a:schemeClr val="bg1"/>
-              </a:solidFill>
-            </a:endParaRPr>
+              <a:t>Dashboards View</a:t>
+            </a:r>
           </a:p>
         </p:txBody>
       </p:sp>
@@ -12889,34 +12792,13 @@
           <a:p>
             <a:pPr algn="ctr"/>
             <a:r>
-              <a:rPr lang="it-IT" b="1" dirty="0" err="1">
-                <a:solidFill>
-                  <a:schemeClr val="bg1"/>
-                </a:solidFill>
-              </a:rPr>
-              <a:t>Integrations</a:t>
-            </a:r>
-            <a:r>
               <a:rPr lang="it-IT" b="1" dirty="0">
                 <a:solidFill>
                   <a:schemeClr val="bg1"/>
                 </a:solidFill>
               </a:rPr>
-              <a:t> </a:t>
-            </a:r>
-            <a:r>
-              <a:rPr lang="it-IT" b="1" dirty="0" err="1">
-                <a:solidFill>
-                  <a:schemeClr val="bg1"/>
-                </a:solidFill>
-              </a:rPr>
-              <a:t>View</a:t>
-            </a:r>
-            <a:endParaRPr lang="it-IT" b="1" dirty="0">
-              <a:solidFill>
-                <a:schemeClr val="bg1"/>
-              </a:solidFill>
-            </a:endParaRPr>
+              <a:t>Integrations View</a:t>
+            </a:r>
           </a:p>
         </p:txBody>
       </p:sp>
@@ -13354,6 +13236,304 @@
       </p:grpSpPr>
       <p:grpSp>
         <p:nvGrpSpPr>
+          <p:cNvPr id="73" name="Gruppo 72">
+            <a:extLst>
+              <a:ext uri="{FF2B5EF4-FFF2-40B4-BE49-F238E27FC236}">
+                <a16:creationId xmlns:a16="http://schemas.microsoft.com/office/drawing/2014/main" id="{0BBF8E63-B812-58B8-EFC3-7FC690EB8741}"/>
+              </a:ext>
+            </a:extLst>
+          </p:cNvPr>
+          <p:cNvGrpSpPr/>
+          <p:nvPr/>
+        </p:nvGrpSpPr>
+        <p:grpSpPr>
+          <a:xfrm>
+            <a:off x="6460429" y="4661608"/>
+            <a:ext cx="4681024" cy="553151"/>
+            <a:chOff x="1701101" y="1802916"/>
+            <a:chExt cx="8886021" cy="3784578"/>
+          </a:xfrm>
+        </p:grpSpPr>
+        <p:sp>
+          <p:nvSpPr>
+            <p:cNvPr id="74" name="Rettangolo con angoli arrotondati 73">
+              <a:extLst>
+                <a:ext uri="{FF2B5EF4-FFF2-40B4-BE49-F238E27FC236}">
+                  <a16:creationId xmlns:a16="http://schemas.microsoft.com/office/drawing/2014/main" id="{EEF8C10D-2F19-7BF4-81F7-531DFE652516}"/>
+                </a:ext>
+              </a:extLst>
+            </p:cNvPr>
+            <p:cNvSpPr/>
+            <p:nvPr/>
+          </p:nvSpPr>
+          <p:spPr>
+            <a:xfrm>
+              <a:off x="1797325" y="1897480"/>
+              <a:ext cx="8789797" cy="3690014"/>
+            </a:xfrm>
+            <a:prstGeom prst="roundRect">
+              <a:avLst/>
+            </a:prstGeom>
+            <a:solidFill>
+              <a:schemeClr val="tx1"/>
+            </a:solidFill>
+            <a:ln>
+              <a:solidFill>
+                <a:schemeClr val="tx1"/>
+              </a:solidFill>
+            </a:ln>
+          </p:spPr>
+          <p:style>
+            <a:lnRef idx="2">
+              <a:schemeClr val="accent1">
+                <a:shade val="15000"/>
+              </a:schemeClr>
+            </a:lnRef>
+            <a:fillRef idx="1">
+              <a:schemeClr val="accent1"/>
+            </a:fillRef>
+            <a:effectRef idx="0">
+              <a:schemeClr val="accent1"/>
+            </a:effectRef>
+            <a:fontRef idx="minor">
+              <a:schemeClr val="lt1"/>
+            </a:fontRef>
+          </p:style>
+          <p:txBody>
+            <a:bodyPr rtlCol="0" anchor="ctr"/>
+            <a:lstStyle/>
+            <a:p>
+              <a:pPr algn="ctr"/>
+              <a:endParaRPr lang="it-IT" dirty="0"/>
+            </a:p>
+          </p:txBody>
+        </p:sp>
+        <p:sp>
+          <p:nvSpPr>
+            <p:cNvPr id="75" name="Rettangolo con angoli arrotondati 74">
+              <a:extLst>
+                <a:ext uri="{FF2B5EF4-FFF2-40B4-BE49-F238E27FC236}">
+                  <a16:creationId xmlns:a16="http://schemas.microsoft.com/office/drawing/2014/main" id="{4637E4BD-44FA-F436-A862-F3198CFBDA1B}"/>
+                </a:ext>
+              </a:extLst>
+            </p:cNvPr>
+            <p:cNvSpPr/>
+            <p:nvPr/>
+          </p:nvSpPr>
+          <p:spPr>
+            <a:xfrm>
+              <a:off x="1701101" y="1802916"/>
+              <a:ext cx="8789797" cy="3690014"/>
+            </a:xfrm>
+            <a:prstGeom prst="roundRect">
+              <a:avLst/>
+            </a:prstGeom>
+            <a:solidFill>
+              <a:srgbClr val="012F5F"/>
+            </a:solidFill>
+            <a:ln>
+              <a:solidFill>
+                <a:srgbClr val="012F5F"/>
+              </a:solidFill>
+            </a:ln>
+          </p:spPr>
+          <p:style>
+            <a:lnRef idx="2">
+              <a:schemeClr val="accent1">
+                <a:shade val="15000"/>
+              </a:schemeClr>
+            </a:lnRef>
+            <a:fillRef idx="1">
+              <a:schemeClr val="accent1"/>
+            </a:fillRef>
+            <a:effectRef idx="0">
+              <a:schemeClr val="accent1"/>
+            </a:effectRef>
+            <a:fontRef idx="minor">
+              <a:schemeClr val="lt1"/>
+            </a:fontRef>
+          </p:style>
+          <p:txBody>
+            <a:bodyPr rtlCol="0" anchor="ctr"/>
+            <a:lstStyle/>
+            <a:p>
+              <a:pPr algn="ctr"/>
+              <a:endParaRPr lang="it-IT" dirty="0"/>
+            </a:p>
+          </p:txBody>
+        </p:sp>
+      </p:grpSp>
+      <p:grpSp>
+        <p:nvGrpSpPr>
+          <p:cNvPr id="67" name="Gruppo 66">
+            <a:extLst>
+              <a:ext uri="{FF2B5EF4-FFF2-40B4-BE49-F238E27FC236}">
+                <a16:creationId xmlns:a16="http://schemas.microsoft.com/office/drawing/2014/main" id="{7A7D0C63-DDD8-66FC-8D71-FDDBA875986E}"/>
+              </a:ext>
+            </a:extLst>
+          </p:cNvPr>
+          <p:cNvGrpSpPr/>
+          <p:nvPr/>
+        </p:nvGrpSpPr>
+        <p:grpSpPr>
+          <a:xfrm>
+            <a:off x="6460429" y="3948647"/>
+            <a:ext cx="4681024" cy="553151"/>
+            <a:chOff x="1701101" y="1802916"/>
+            <a:chExt cx="8886021" cy="3784578"/>
+          </a:xfrm>
+        </p:grpSpPr>
+        <p:sp>
+          <p:nvSpPr>
+            <p:cNvPr id="68" name="Rettangolo con angoli arrotondati 67">
+              <a:extLst>
+                <a:ext uri="{FF2B5EF4-FFF2-40B4-BE49-F238E27FC236}">
+                  <a16:creationId xmlns:a16="http://schemas.microsoft.com/office/drawing/2014/main" id="{117C8E20-E45B-F435-AE65-B41F9C6BC7B8}"/>
+                </a:ext>
+              </a:extLst>
+            </p:cNvPr>
+            <p:cNvSpPr/>
+            <p:nvPr/>
+          </p:nvSpPr>
+          <p:spPr>
+            <a:xfrm>
+              <a:off x="1797325" y="1897480"/>
+              <a:ext cx="8789797" cy="3690014"/>
+            </a:xfrm>
+            <a:prstGeom prst="roundRect">
+              <a:avLst/>
+            </a:prstGeom>
+            <a:solidFill>
+              <a:schemeClr val="tx1"/>
+            </a:solidFill>
+            <a:ln>
+              <a:solidFill>
+                <a:schemeClr val="tx1"/>
+              </a:solidFill>
+            </a:ln>
+          </p:spPr>
+          <p:style>
+            <a:lnRef idx="2">
+              <a:schemeClr val="accent1">
+                <a:shade val="15000"/>
+              </a:schemeClr>
+            </a:lnRef>
+            <a:fillRef idx="1">
+              <a:schemeClr val="accent1"/>
+            </a:fillRef>
+            <a:effectRef idx="0">
+              <a:schemeClr val="accent1"/>
+            </a:effectRef>
+            <a:fontRef idx="minor">
+              <a:schemeClr val="lt1"/>
+            </a:fontRef>
+          </p:style>
+          <p:txBody>
+            <a:bodyPr rtlCol="0" anchor="ctr"/>
+            <a:lstStyle/>
+            <a:p>
+              <a:pPr algn="ctr"/>
+              <a:endParaRPr lang="it-IT" dirty="0"/>
+            </a:p>
+          </p:txBody>
+        </p:sp>
+        <p:sp>
+          <p:nvSpPr>
+            <p:cNvPr id="72" name="Rettangolo con angoli arrotondati 71">
+              <a:extLst>
+                <a:ext uri="{FF2B5EF4-FFF2-40B4-BE49-F238E27FC236}">
+                  <a16:creationId xmlns:a16="http://schemas.microsoft.com/office/drawing/2014/main" id="{5C278FE9-FE55-94E7-4DE6-3D7DD88D3832}"/>
+                </a:ext>
+              </a:extLst>
+            </p:cNvPr>
+            <p:cNvSpPr/>
+            <p:nvPr/>
+          </p:nvSpPr>
+          <p:spPr>
+            <a:xfrm>
+              <a:off x="1701101" y="1802916"/>
+              <a:ext cx="8789797" cy="3690014"/>
+            </a:xfrm>
+            <a:prstGeom prst="roundRect">
+              <a:avLst/>
+            </a:prstGeom>
+            <a:solidFill>
+              <a:srgbClr val="012F5F"/>
+            </a:solidFill>
+            <a:ln>
+              <a:solidFill>
+                <a:srgbClr val="012F5F"/>
+              </a:solidFill>
+            </a:ln>
+          </p:spPr>
+          <p:style>
+            <a:lnRef idx="2">
+              <a:schemeClr val="accent1">
+                <a:shade val="15000"/>
+              </a:schemeClr>
+            </a:lnRef>
+            <a:fillRef idx="1">
+              <a:schemeClr val="accent1"/>
+            </a:fillRef>
+            <a:effectRef idx="0">
+              <a:schemeClr val="accent1"/>
+            </a:effectRef>
+            <a:fontRef idx="minor">
+              <a:schemeClr val="lt1"/>
+            </a:fontRef>
+          </p:style>
+          <p:txBody>
+            <a:bodyPr rtlCol="0" anchor="ctr"/>
+            <a:lstStyle/>
+            <a:p>
+              <a:pPr algn="ctr"/>
+              <a:endParaRPr lang="it-IT" dirty="0"/>
+            </a:p>
+          </p:txBody>
+        </p:sp>
+      </p:grpSp>
+      <p:sp>
+        <p:nvSpPr>
+          <p:cNvPr id="47" name="CasellaDiTesto 46">
+            <a:extLst>
+              <a:ext uri="{FF2B5EF4-FFF2-40B4-BE49-F238E27FC236}">
+                <a16:creationId xmlns:a16="http://schemas.microsoft.com/office/drawing/2014/main" id="{3A15EDE1-6DC9-79F6-83B4-040D2814782A}"/>
+              </a:ext>
+            </a:extLst>
+          </p:cNvPr>
+          <p:cNvSpPr txBox="1"/>
+          <p:nvPr/>
+        </p:nvSpPr>
+        <p:spPr>
+          <a:xfrm>
+            <a:off x="6470819" y="4746607"/>
+            <a:ext cx="4564846" cy="369332"/>
+          </a:xfrm>
+          <a:prstGeom prst="rect">
+            <a:avLst/>
+          </a:prstGeom>
+          <a:noFill/>
+        </p:spPr>
+        <p:txBody>
+          <a:bodyPr wrap="square" rtlCol="0">
+            <a:spAutoFit/>
+          </a:bodyPr>
+          <a:lstStyle/>
+          <a:p>
+            <a:pPr algn="ctr"/>
+            <a:r>
+              <a:rPr lang="it-IT" b="1" dirty="0">
+                <a:solidFill>
+                  <a:schemeClr val="bg1"/>
+                </a:solidFill>
+              </a:rPr>
+              <a:t>Identify reconnaissance behavior</a:t>
+            </a:r>
+          </a:p>
+        </p:txBody>
+      </p:sp>
+      <p:grpSp>
+        <p:nvGrpSpPr>
           <p:cNvPr id="5" name="Gruppo 4">
             <a:extLst>
               <a:ext uri="{FF2B5EF4-FFF2-40B4-BE49-F238E27FC236}">
@@ -13531,914 +13711,12 @@
           </a:p>
         </p:txBody>
       </p:sp>
-      <p:grpSp>
-        <p:nvGrpSpPr>
-          <p:cNvPr id="71" name="Gruppo 70">
-            <a:extLst>
-              <a:ext uri="{FF2B5EF4-FFF2-40B4-BE49-F238E27FC236}">
-                <a16:creationId xmlns:a16="http://schemas.microsoft.com/office/drawing/2014/main" id="{B4275084-2AC9-94D3-3FF7-456696414FBE}"/>
-              </a:ext>
-            </a:extLst>
-          </p:cNvPr>
-          <p:cNvGrpSpPr/>
-          <p:nvPr/>
-        </p:nvGrpSpPr>
-        <p:grpSpPr>
-          <a:xfrm>
-            <a:off x="6407427" y="1706696"/>
-            <a:ext cx="4474962" cy="4002727"/>
-            <a:chOff x="729991" y="1741237"/>
-            <a:chExt cx="4474962" cy="4002727"/>
-          </a:xfrm>
-        </p:grpSpPr>
-        <p:grpSp>
-          <p:nvGrpSpPr>
-            <p:cNvPr id="8" name="Gruppo 7">
-              <a:extLst>
-                <a:ext uri="{FF2B5EF4-FFF2-40B4-BE49-F238E27FC236}">
-                  <a16:creationId xmlns:a16="http://schemas.microsoft.com/office/drawing/2014/main" id="{EFC133BE-CDF2-3A80-D362-A29CF5DB8B5F}"/>
-                </a:ext>
-              </a:extLst>
-            </p:cNvPr>
-            <p:cNvGrpSpPr/>
-            <p:nvPr/>
-          </p:nvGrpSpPr>
-          <p:grpSpPr>
-            <a:xfrm>
-              <a:off x="739768" y="1741237"/>
-              <a:ext cx="4455408" cy="646332"/>
-              <a:chOff x="1701101" y="1802916"/>
-              <a:chExt cx="8886021" cy="3784578"/>
-            </a:xfrm>
-          </p:grpSpPr>
-          <p:sp>
-            <p:nvSpPr>
-              <p:cNvPr id="9" name="Rettangolo con angoli arrotondati 8">
-                <a:extLst>
-                  <a:ext uri="{FF2B5EF4-FFF2-40B4-BE49-F238E27FC236}">
-                    <a16:creationId xmlns:a16="http://schemas.microsoft.com/office/drawing/2014/main" id="{E26B9950-D2A2-72A0-7CEB-3CC56E563EC7}"/>
-                  </a:ext>
-                </a:extLst>
-              </p:cNvPr>
-              <p:cNvSpPr/>
-              <p:nvPr/>
-            </p:nvSpPr>
-            <p:spPr>
-              <a:xfrm>
-                <a:off x="1797325" y="1897480"/>
-                <a:ext cx="8789797" cy="3690014"/>
-              </a:xfrm>
-              <a:prstGeom prst="roundRect">
-                <a:avLst/>
-              </a:prstGeom>
-              <a:solidFill>
-                <a:schemeClr val="tx1"/>
-              </a:solidFill>
-              <a:ln>
-                <a:solidFill>
-                  <a:schemeClr val="tx1"/>
-                </a:solidFill>
-              </a:ln>
-            </p:spPr>
-            <p:style>
-              <a:lnRef idx="2">
-                <a:schemeClr val="accent1">
-                  <a:shade val="15000"/>
-                </a:schemeClr>
-              </a:lnRef>
-              <a:fillRef idx="1">
-                <a:schemeClr val="accent1"/>
-              </a:fillRef>
-              <a:effectRef idx="0">
-                <a:schemeClr val="accent1"/>
-              </a:effectRef>
-              <a:fontRef idx="minor">
-                <a:schemeClr val="lt1"/>
-              </a:fontRef>
-            </p:style>
-            <p:txBody>
-              <a:bodyPr rtlCol="0" anchor="ctr"/>
-              <a:lstStyle/>
-              <a:p>
-                <a:pPr algn="ctr"/>
-                <a:endParaRPr lang="it-IT" dirty="0"/>
-              </a:p>
-            </p:txBody>
-          </p:sp>
-          <p:sp>
-            <p:nvSpPr>
-              <p:cNvPr id="10" name="Rettangolo con angoli arrotondati 9">
-                <a:extLst>
-                  <a:ext uri="{FF2B5EF4-FFF2-40B4-BE49-F238E27FC236}">
-                    <a16:creationId xmlns:a16="http://schemas.microsoft.com/office/drawing/2014/main" id="{C9B40EF8-AF90-885A-0D9A-523860BF4039}"/>
-                  </a:ext>
-                </a:extLst>
-              </p:cNvPr>
-              <p:cNvSpPr/>
-              <p:nvPr/>
-            </p:nvSpPr>
-            <p:spPr>
-              <a:xfrm>
-                <a:off x="1701101" y="1802916"/>
-                <a:ext cx="8789797" cy="3690014"/>
-              </a:xfrm>
-              <a:prstGeom prst="roundRect">
-                <a:avLst/>
-              </a:prstGeom>
-              <a:solidFill>
-                <a:srgbClr val="012F5F"/>
-              </a:solidFill>
-              <a:ln>
-                <a:solidFill>
-                  <a:srgbClr val="012F5F"/>
-                </a:solidFill>
-              </a:ln>
-            </p:spPr>
-            <p:style>
-              <a:lnRef idx="2">
-                <a:schemeClr val="accent1">
-                  <a:shade val="15000"/>
-                </a:schemeClr>
-              </a:lnRef>
-              <a:fillRef idx="1">
-                <a:schemeClr val="accent1"/>
-              </a:fillRef>
-              <a:effectRef idx="0">
-                <a:schemeClr val="accent1"/>
-              </a:effectRef>
-              <a:fontRef idx="minor">
-                <a:schemeClr val="lt1"/>
-              </a:fontRef>
-            </p:style>
-            <p:txBody>
-              <a:bodyPr rtlCol="0" anchor="ctr"/>
-              <a:lstStyle/>
-              <a:p>
-                <a:pPr algn="ctr"/>
-                <a:endParaRPr lang="it-IT" dirty="0"/>
-              </a:p>
-            </p:txBody>
-          </p:sp>
-        </p:grpSp>
-        <p:sp>
-          <p:nvSpPr>
-            <p:cNvPr id="26" name="CasellaDiTesto 25">
-              <a:extLst>
-                <a:ext uri="{FF2B5EF4-FFF2-40B4-BE49-F238E27FC236}">
-                  <a16:creationId xmlns:a16="http://schemas.microsoft.com/office/drawing/2014/main" id="{0CBAE9EA-A5EA-2BC8-CFFC-3EC72A7D01A7}"/>
-                </a:ext>
-              </a:extLst>
-            </p:cNvPr>
-            <p:cNvSpPr txBox="1"/>
-            <p:nvPr/>
-          </p:nvSpPr>
-          <p:spPr>
-            <a:xfrm>
-              <a:off x="729991" y="1871662"/>
-              <a:ext cx="4417374" cy="369332"/>
-            </a:xfrm>
-            <a:prstGeom prst="rect">
-              <a:avLst/>
-            </a:prstGeom>
-            <a:noFill/>
-          </p:spPr>
-          <p:txBody>
-            <a:bodyPr wrap="square" rtlCol="0">
-              <a:spAutoFit/>
-            </a:bodyPr>
-            <a:lstStyle/>
-            <a:p>
-              <a:pPr algn="ctr"/>
-              <a:r>
-                <a:rPr lang="it-IT" b="1" dirty="0">
-                  <a:solidFill>
-                    <a:schemeClr val="bg1"/>
-                  </a:solidFill>
-                </a:rPr>
-                <a:t>Early detection of malware infections</a:t>
-              </a:r>
-            </a:p>
-          </p:txBody>
-        </p:sp>
-        <p:grpSp>
-          <p:nvGrpSpPr>
-            <p:cNvPr id="32" name="Gruppo 31">
-              <a:extLst>
-                <a:ext uri="{FF2B5EF4-FFF2-40B4-BE49-F238E27FC236}">
-                  <a16:creationId xmlns:a16="http://schemas.microsoft.com/office/drawing/2014/main" id="{D1C65764-A073-3AFC-AEBF-F826F5BB1CA3}"/>
-                </a:ext>
-              </a:extLst>
-            </p:cNvPr>
-            <p:cNvGrpSpPr/>
-            <p:nvPr/>
-          </p:nvGrpSpPr>
-          <p:grpSpPr>
-            <a:xfrm>
-              <a:off x="749545" y="2566678"/>
-              <a:ext cx="4455408" cy="646332"/>
-              <a:chOff x="1701101" y="1802916"/>
-              <a:chExt cx="8886021" cy="3784578"/>
-            </a:xfrm>
-          </p:grpSpPr>
-          <p:sp>
-            <p:nvSpPr>
-              <p:cNvPr id="33" name="Rettangolo con angoli arrotondati 32">
-                <a:extLst>
-                  <a:ext uri="{FF2B5EF4-FFF2-40B4-BE49-F238E27FC236}">
-                    <a16:creationId xmlns:a16="http://schemas.microsoft.com/office/drawing/2014/main" id="{9EF2DFA5-410A-3C19-EC4E-39CEDA63D47E}"/>
-                  </a:ext>
-                </a:extLst>
-              </p:cNvPr>
-              <p:cNvSpPr/>
-              <p:nvPr/>
-            </p:nvSpPr>
-            <p:spPr>
-              <a:xfrm>
-                <a:off x="1797325" y="1897480"/>
-                <a:ext cx="8789797" cy="3690014"/>
-              </a:xfrm>
-              <a:prstGeom prst="roundRect">
-                <a:avLst/>
-              </a:prstGeom>
-              <a:solidFill>
-                <a:schemeClr val="tx1"/>
-              </a:solidFill>
-              <a:ln>
-                <a:solidFill>
-                  <a:schemeClr val="tx1"/>
-                </a:solidFill>
-              </a:ln>
-            </p:spPr>
-            <p:style>
-              <a:lnRef idx="2">
-                <a:schemeClr val="accent1">
-                  <a:shade val="15000"/>
-                </a:schemeClr>
-              </a:lnRef>
-              <a:fillRef idx="1">
-                <a:schemeClr val="accent1"/>
-              </a:fillRef>
-              <a:effectRef idx="0">
-                <a:schemeClr val="accent1"/>
-              </a:effectRef>
-              <a:fontRef idx="minor">
-                <a:schemeClr val="lt1"/>
-              </a:fontRef>
-            </p:style>
-            <p:txBody>
-              <a:bodyPr rtlCol="0" anchor="ctr"/>
-              <a:lstStyle/>
-              <a:p>
-                <a:pPr algn="ctr"/>
-                <a:endParaRPr lang="it-IT" dirty="0"/>
-              </a:p>
-            </p:txBody>
-          </p:sp>
-          <p:sp>
-            <p:nvSpPr>
-              <p:cNvPr id="34" name="Rettangolo con angoli arrotondati 33">
-                <a:extLst>
-                  <a:ext uri="{FF2B5EF4-FFF2-40B4-BE49-F238E27FC236}">
-                    <a16:creationId xmlns:a16="http://schemas.microsoft.com/office/drawing/2014/main" id="{A93A5FCA-BAA3-FF9A-BCB6-CB9B04A6E772}"/>
-                  </a:ext>
-                </a:extLst>
-              </p:cNvPr>
-              <p:cNvSpPr/>
-              <p:nvPr/>
-            </p:nvSpPr>
-            <p:spPr>
-              <a:xfrm>
-                <a:off x="1701101" y="1802916"/>
-                <a:ext cx="8789797" cy="3690014"/>
-              </a:xfrm>
-              <a:prstGeom prst="roundRect">
-                <a:avLst/>
-              </a:prstGeom>
-              <a:solidFill>
-                <a:srgbClr val="012F5F"/>
-              </a:solidFill>
-              <a:ln>
-                <a:solidFill>
-                  <a:srgbClr val="012F5F"/>
-                </a:solidFill>
-              </a:ln>
-            </p:spPr>
-            <p:style>
-              <a:lnRef idx="2">
-                <a:schemeClr val="accent1">
-                  <a:shade val="15000"/>
-                </a:schemeClr>
-              </a:lnRef>
-              <a:fillRef idx="1">
-                <a:schemeClr val="accent1"/>
-              </a:fillRef>
-              <a:effectRef idx="0">
-                <a:schemeClr val="accent1"/>
-              </a:effectRef>
-              <a:fontRef idx="minor">
-                <a:schemeClr val="lt1"/>
-              </a:fontRef>
-            </p:style>
-            <p:txBody>
-              <a:bodyPr rtlCol="0" anchor="ctr"/>
-              <a:lstStyle/>
-              <a:p>
-                <a:pPr algn="ctr"/>
-                <a:endParaRPr lang="it-IT" dirty="0"/>
-              </a:p>
-            </p:txBody>
-          </p:sp>
-        </p:grpSp>
-        <p:sp>
-          <p:nvSpPr>
-            <p:cNvPr id="35" name="CasellaDiTesto 34">
-              <a:extLst>
-                <a:ext uri="{FF2B5EF4-FFF2-40B4-BE49-F238E27FC236}">
-                  <a16:creationId xmlns:a16="http://schemas.microsoft.com/office/drawing/2014/main" id="{0158F9D1-8870-EADF-F292-13BA35EBB4AE}"/>
-                </a:ext>
-              </a:extLst>
-            </p:cNvPr>
-            <p:cNvSpPr txBox="1"/>
-            <p:nvPr/>
-          </p:nvSpPr>
-          <p:spPr>
-            <a:xfrm>
-              <a:off x="739768" y="2697103"/>
-              <a:ext cx="4417374" cy="369332"/>
-            </a:xfrm>
-            <a:prstGeom prst="rect">
-              <a:avLst/>
-            </a:prstGeom>
-            <a:noFill/>
-          </p:spPr>
-          <p:txBody>
-            <a:bodyPr wrap="square" rtlCol="0">
-              <a:spAutoFit/>
-            </a:bodyPr>
-            <a:lstStyle/>
-            <a:p>
-              <a:pPr algn="ctr"/>
-              <a:r>
-                <a:rPr lang="it-IT" b="1" dirty="0">
-                  <a:solidFill>
-                    <a:schemeClr val="bg1"/>
-                  </a:solidFill>
-                </a:rPr>
-                <a:t>Unconver data exfiltration attempts</a:t>
-              </a:r>
-            </a:p>
-          </p:txBody>
-        </p:sp>
-        <p:grpSp>
-          <p:nvGrpSpPr>
-            <p:cNvPr id="38" name="Gruppo 37">
-              <a:extLst>
-                <a:ext uri="{FF2B5EF4-FFF2-40B4-BE49-F238E27FC236}">
-                  <a16:creationId xmlns:a16="http://schemas.microsoft.com/office/drawing/2014/main" id="{111A65BD-C973-0D24-A8E7-E432E947EBBE}"/>
-                </a:ext>
-              </a:extLst>
-            </p:cNvPr>
-            <p:cNvGrpSpPr/>
-            <p:nvPr/>
-          </p:nvGrpSpPr>
-          <p:grpSpPr>
-            <a:xfrm>
-              <a:off x="739768" y="4266010"/>
-              <a:ext cx="4455408" cy="646332"/>
-              <a:chOff x="1701101" y="1802916"/>
-              <a:chExt cx="8886021" cy="3784578"/>
-            </a:xfrm>
-          </p:grpSpPr>
-          <p:sp>
-            <p:nvSpPr>
-              <p:cNvPr id="39" name="Rettangolo con angoli arrotondati 38">
-                <a:extLst>
-                  <a:ext uri="{FF2B5EF4-FFF2-40B4-BE49-F238E27FC236}">
-                    <a16:creationId xmlns:a16="http://schemas.microsoft.com/office/drawing/2014/main" id="{6E3065A8-97BF-5550-1B38-061E08DF785E}"/>
-                  </a:ext>
-                </a:extLst>
-              </p:cNvPr>
-              <p:cNvSpPr/>
-              <p:nvPr/>
-            </p:nvSpPr>
-            <p:spPr>
-              <a:xfrm>
-                <a:off x="1797325" y="1897480"/>
-                <a:ext cx="8789797" cy="3690014"/>
-              </a:xfrm>
-              <a:prstGeom prst="roundRect">
-                <a:avLst/>
-              </a:prstGeom>
-              <a:solidFill>
-                <a:schemeClr val="tx1"/>
-              </a:solidFill>
-              <a:ln>
-                <a:solidFill>
-                  <a:schemeClr val="tx1"/>
-                </a:solidFill>
-              </a:ln>
-            </p:spPr>
-            <p:style>
-              <a:lnRef idx="2">
-                <a:schemeClr val="accent1">
-                  <a:shade val="15000"/>
-                </a:schemeClr>
-              </a:lnRef>
-              <a:fillRef idx="1">
-                <a:schemeClr val="accent1"/>
-              </a:fillRef>
-              <a:effectRef idx="0">
-                <a:schemeClr val="accent1"/>
-              </a:effectRef>
-              <a:fontRef idx="minor">
-                <a:schemeClr val="lt1"/>
-              </a:fontRef>
-            </p:style>
-            <p:txBody>
-              <a:bodyPr rtlCol="0" anchor="ctr"/>
-              <a:lstStyle/>
-              <a:p>
-                <a:pPr algn="ctr"/>
-                <a:endParaRPr lang="it-IT" dirty="0"/>
-              </a:p>
-            </p:txBody>
-          </p:sp>
-          <p:sp>
-            <p:nvSpPr>
-              <p:cNvPr id="40" name="Rettangolo con angoli arrotondati 39">
-                <a:extLst>
-                  <a:ext uri="{FF2B5EF4-FFF2-40B4-BE49-F238E27FC236}">
-                    <a16:creationId xmlns:a16="http://schemas.microsoft.com/office/drawing/2014/main" id="{232792F8-3721-D3BB-C802-C11D7B478AA4}"/>
-                  </a:ext>
-                </a:extLst>
-              </p:cNvPr>
-              <p:cNvSpPr/>
-              <p:nvPr/>
-            </p:nvSpPr>
-            <p:spPr>
-              <a:xfrm>
-                <a:off x="1701101" y="1802916"/>
-                <a:ext cx="8789797" cy="3690014"/>
-              </a:xfrm>
-              <a:prstGeom prst="roundRect">
-                <a:avLst/>
-              </a:prstGeom>
-              <a:solidFill>
-                <a:srgbClr val="012F5F"/>
-              </a:solidFill>
-              <a:ln>
-                <a:solidFill>
-                  <a:srgbClr val="012F5F"/>
-                </a:solidFill>
-              </a:ln>
-            </p:spPr>
-            <p:style>
-              <a:lnRef idx="2">
-                <a:schemeClr val="accent1">
-                  <a:shade val="15000"/>
-                </a:schemeClr>
-              </a:lnRef>
-              <a:fillRef idx="1">
-                <a:schemeClr val="accent1"/>
-              </a:fillRef>
-              <a:effectRef idx="0">
-                <a:schemeClr val="accent1"/>
-              </a:effectRef>
-              <a:fontRef idx="minor">
-                <a:schemeClr val="lt1"/>
-              </a:fontRef>
-            </p:style>
-            <p:txBody>
-              <a:bodyPr rtlCol="0" anchor="ctr"/>
-              <a:lstStyle/>
-              <a:p>
-                <a:pPr algn="ctr"/>
-                <a:endParaRPr lang="it-IT" dirty="0"/>
-              </a:p>
-            </p:txBody>
-          </p:sp>
-        </p:grpSp>
-        <p:sp>
-          <p:nvSpPr>
-            <p:cNvPr id="41" name="CasellaDiTesto 40">
-              <a:extLst>
-                <a:ext uri="{FF2B5EF4-FFF2-40B4-BE49-F238E27FC236}">
-                  <a16:creationId xmlns:a16="http://schemas.microsoft.com/office/drawing/2014/main" id="{B4F4EBA0-371A-A945-06D1-DDD7E93B8F2E}"/>
-                </a:ext>
-              </a:extLst>
-            </p:cNvPr>
-            <p:cNvSpPr txBox="1"/>
-            <p:nvPr/>
-          </p:nvSpPr>
-          <p:spPr>
-            <a:xfrm>
-              <a:off x="729991" y="4396435"/>
-              <a:ext cx="4417374" cy="369332"/>
-            </a:xfrm>
-            <a:prstGeom prst="rect">
-              <a:avLst/>
-            </a:prstGeom>
-            <a:noFill/>
-          </p:spPr>
-          <p:txBody>
-            <a:bodyPr wrap="square" rtlCol="0">
-              <a:spAutoFit/>
-            </a:bodyPr>
-            <a:lstStyle/>
-            <a:p>
-              <a:pPr algn="ctr"/>
-              <a:r>
-                <a:rPr lang="it-IT" b="1" dirty="0">
-                  <a:solidFill>
-                    <a:schemeClr val="bg1"/>
-                  </a:solidFill>
-                </a:rPr>
-                <a:t>Expose coordinated or persistent threats</a:t>
-              </a:r>
-            </a:p>
-          </p:txBody>
-        </p:sp>
-        <p:grpSp>
-          <p:nvGrpSpPr>
-            <p:cNvPr id="44" name="Gruppo 43">
-              <a:extLst>
-                <a:ext uri="{FF2B5EF4-FFF2-40B4-BE49-F238E27FC236}">
-                  <a16:creationId xmlns:a16="http://schemas.microsoft.com/office/drawing/2014/main" id="{47E069F8-9BC6-204D-6918-21E012443DD5}"/>
-                </a:ext>
-              </a:extLst>
-            </p:cNvPr>
-            <p:cNvGrpSpPr/>
-            <p:nvPr/>
-          </p:nvGrpSpPr>
-          <p:grpSpPr>
-            <a:xfrm>
-              <a:off x="739768" y="5097632"/>
-              <a:ext cx="4455408" cy="646332"/>
-              <a:chOff x="1701101" y="1802916"/>
-              <a:chExt cx="8886021" cy="3784578"/>
-            </a:xfrm>
-          </p:grpSpPr>
-          <p:sp>
-            <p:nvSpPr>
-              <p:cNvPr id="45" name="Rettangolo con angoli arrotondati 44">
-                <a:extLst>
-                  <a:ext uri="{FF2B5EF4-FFF2-40B4-BE49-F238E27FC236}">
-                    <a16:creationId xmlns:a16="http://schemas.microsoft.com/office/drawing/2014/main" id="{0FE6B940-758A-860F-97CE-98217BE4C802}"/>
-                  </a:ext>
-                </a:extLst>
-              </p:cNvPr>
-              <p:cNvSpPr/>
-              <p:nvPr/>
-            </p:nvSpPr>
-            <p:spPr>
-              <a:xfrm>
-                <a:off x="1797325" y="1897480"/>
-                <a:ext cx="8789797" cy="3690014"/>
-              </a:xfrm>
-              <a:prstGeom prst="roundRect">
-                <a:avLst/>
-              </a:prstGeom>
-              <a:solidFill>
-                <a:schemeClr val="tx1"/>
-              </a:solidFill>
-              <a:ln>
-                <a:solidFill>
-                  <a:schemeClr val="tx1"/>
-                </a:solidFill>
-              </a:ln>
-            </p:spPr>
-            <p:style>
-              <a:lnRef idx="2">
-                <a:schemeClr val="accent1">
-                  <a:shade val="15000"/>
-                </a:schemeClr>
-              </a:lnRef>
-              <a:fillRef idx="1">
-                <a:schemeClr val="accent1"/>
-              </a:fillRef>
-              <a:effectRef idx="0">
-                <a:schemeClr val="accent1"/>
-              </a:effectRef>
-              <a:fontRef idx="minor">
-                <a:schemeClr val="lt1"/>
-              </a:fontRef>
-            </p:style>
-            <p:txBody>
-              <a:bodyPr rtlCol="0" anchor="ctr"/>
-              <a:lstStyle/>
-              <a:p>
-                <a:pPr algn="ctr"/>
-                <a:endParaRPr lang="it-IT" dirty="0"/>
-              </a:p>
-            </p:txBody>
-          </p:sp>
-          <p:sp>
-            <p:nvSpPr>
-              <p:cNvPr id="46" name="Rettangolo con angoli arrotondati 45">
-                <a:extLst>
-                  <a:ext uri="{FF2B5EF4-FFF2-40B4-BE49-F238E27FC236}">
-                    <a16:creationId xmlns:a16="http://schemas.microsoft.com/office/drawing/2014/main" id="{DFADA06A-D90F-965B-3D56-28B8D41E4C9C}"/>
-                  </a:ext>
-                </a:extLst>
-              </p:cNvPr>
-              <p:cNvSpPr/>
-              <p:nvPr/>
-            </p:nvSpPr>
-            <p:spPr>
-              <a:xfrm>
-                <a:off x="1701101" y="1802916"/>
-                <a:ext cx="8789797" cy="3690014"/>
-              </a:xfrm>
-              <a:prstGeom prst="roundRect">
-                <a:avLst/>
-              </a:prstGeom>
-              <a:solidFill>
-                <a:srgbClr val="012F5F"/>
-              </a:solidFill>
-              <a:ln>
-                <a:solidFill>
-                  <a:srgbClr val="012F5F"/>
-                </a:solidFill>
-              </a:ln>
-            </p:spPr>
-            <p:style>
-              <a:lnRef idx="2">
-                <a:schemeClr val="accent1">
-                  <a:shade val="15000"/>
-                </a:schemeClr>
-              </a:lnRef>
-              <a:fillRef idx="1">
-                <a:schemeClr val="accent1"/>
-              </a:fillRef>
-              <a:effectRef idx="0">
-                <a:schemeClr val="accent1"/>
-              </a:effectRef>
-              <a:fontRef idx="minor">
-                <a:schemeClr val="lt1"/>
-              </a:fontRef>
-            </p:style>
-            <p:txBody>
-              <a:bodyPr rtlCol="0" anchor="ctr"/>
-              <a:lstStyle/>
-              <a:p>
-                <a:pPr algn="ctr"/>
-                <a:endParaRPr lang="it-IT" dirty="0"/>
-              </a:p>
-            </p:txBody>
-          </p:sp>
-        </p:grpSp>
-        <p:sp>
-          <p:nvSpPr>
-            <p:cNvPr id="47" name="CasellaDiTesto 46">
-              <a:extLst>
-                <a:ext uri="{FF2B5EF4-FFF2-40B4-BE49-F238E27FC236}">
-                  <a16:creationId xmlns:a16="http://schemas.microsoft.com/office/drawing/2014/main" id="{3A15EDE1-6DC9-79F6-83B4-040D2814782A}"/>
-                </a:ext>
-              </a:extLst>
-            </p:cNvPr>
-            <p:cNvSpPr txBox="1"/>
-            <p:nvPr/>
-          </p:nvSpPr>
-          <p:spPr>
-            <a:xfrm>
-              <a:off x="729991" y="5228057"/>
-              <a:ext cx="4417374" cy="369332"/>
-            </a:xfrm>
-            <a:prstGeom prst="rect">
-              <a:avLst/>
-            </a:prstGeom>
-            <a:noFill/>
-          </p:spPr>
-          <p:txBody>
-            <a:bodyPr wrap="square" rtlCol="0">
-              <a:spAutoFit/>
-            </a:bodyPr>
-            <a:lstStyle/>
-            <a:p>
-              <a:pPr algn="ctr"/>
-              <a:r>
-                <a:rPr lang="it-IT" b="1" dirty="0">
-                  <a:solidFill>
-                    <a:schemeClr val="bg1"/>
-                  </a:solidFill>
-                </a:rPr>
-                <a:t>Identify reconnaissance behavior</a:t>
-              </a:r>
-            </a:p>
-          </p:txBody>
-        </p:sp>
-        <p:grpSp>
-          <p:nvGrpSpPr>
-            <p:cNvPr id="48" name="Gruppo 47">
-              <a:extLst>
-                <a:ext uri="{FF2B5EF4-FFF2-40B4-BE49-F238E27FC236}">
-                  <a16:creationId xmlns:a16="http://schemas.microsoft.com/office/drawing/2014/main" id="{8FACE15C-8187-6A70-B282-C7A3745D3635}"/>
-                </a:ext>
-              </a:extLst>
-            </p:cNvPr>
-            <p:cNvGrpSpPr/>
-            <p:nvPr/>
-          </p:nvGrpSpPr>
-          <p:grpSpPr>
-            <a:xfrm>
-              <a:off x="749545" y="3408269"/>
-              <a:ext cx="4455408" cy="646332"/>
-              <a:chOff x="1701101" y="1802916"/>
-              <a:chExt cx="8886021" cy="3784578"/>
-            </a:xfrm>
-          </p:grpSpPr>
-          <p:sp>
-            <p:nvSpPr>
-              <p:cNvPr id="49" name="Rettangolo con angoli arrotondati 48">
-                <a:extLst>
-                  <a:ext uri="{FF2B5EF4-FFF2-40B4-BE49-F238E27FC236}">
-                    <a16:creationId xmlns:a16="http://schemas.microsoft.com/office/drawing/2014/main" id="{72C593F9-AB3A-5F37-7EF8-8365C2C57898}"/>
-                  </a:ext>
-                </a:extLst>
-              </p:cNvPr>
-              <p:cNvSpPr/>
-              <p:nvPr/>
-            </p:nvSpPr>
-            <p:spPr>
-              <a:xfrm>
-                <a:off x="1797325" y="1897480"/>
-                <a:ext cx="8789797" cy="3690014"/>
-              </a:xfrm>
-              <a:prstGeom prst="roundRect">
-                <a:avLst/>
-              </a:prstGeom>
-              <a:solidFill>
-                <a:schemeClr val="tx1"/>
-              </a:solidFill>
-              <a:ln>
-                <a:solidFill>
-                  <a:schemeClr val="tx1"/>
-                </a:solidFill>
-              </a:ln>
-            </p:spPr>
-            <p:style>
-              <a:lnRef idx="2">
-                <a:schemeClr val="accent1">
-                  <a:shade val="15000"/>
-                </a:schemeClr>
-              </a:lnRef>
-              <a:fillRef idx="1">
-                <a:schemeClr val="accent1"/>
-              </a:fillRef>
-              <a:effectRef idx="0">
-                <a:schemeClr val="accent1"/>
-              </a:effectRef>
-              <a:fontRef idx="minor">
-                <a:schemeClr val="lt1"/>
-              </a:fontRef>
-            </p:style>
-            <p:txBody>
-              <a:bodyPr rtlCol="0" anchor="ctr"/>
-              <a:lstStyle/>
-              <a:p>
-                <a:pPr algn="ctr"/>
-                <a:endParaRPr lang="it-IT" dirty="0"/>
-              </a:p>
-            </p:txBody>
-          </p:sp>
-          <p:sp>
-            <p:nvSpPr>
-              <p:cNvPr id="50" name="Rettangolo con angoli arrotondati 49">
-                <a:extLst>
-                  <a:ext uri="{FF2B5EF4-FFF2-40B4-BE49-F238E27FC236}">
-                    <a16:creationId xmlns:a16="http://schemas.microsoft.com/office/drawing/2014/main" id="{EA42108D-14A8-BD69-2497-C84E90DA5159}"/>
-                  </a:ext>
-                </a:extLst>
-              </p:cNvPr>
-              <p:cNvSpPr/>
-              <p:nvPr/>
-            </p:nvSpPr>
-            <p:spPr>
-              <a:xfrm>
-                <a:off x="1701101" y="1802916"/>
-                <a:ext cx="8789797" cy="3690014"/>
-              </a:xfrm>
-              <a:prstGeom prst="roundRect">
-                <a:avLst/>
-              </a:prstGeom>
-              <a:solidFill>
-                <a:srgbClr val="012F5F"/>
-              </a:solidFill>
-              <a:ln>
-                <a:solidFill>
-                  <a:srgbClr val="012F5F"/>
-                </a:solidFill>
-              </a:ln>
-            </p:spPr>
-            <p:style>
-              <a:lnRef idx="2">
-                <a:schemeClr val="accent1">
-                  <a:shade val="15000"/>
-                </a:schemeClr>
-              </a:lnRef>
-              <a:fillRef idx="1">
-                <a:schemeClr val="accent1"/>
-              </a:fillRef>
-              <a:effectRef idx="0">
-                <a:schemeClr val="accent1"/>
-              </a:effectRef>
-              <a:fontRef idx="minor">
-                <a:schemeClr val="lt1"/>
-              </a:fontRef>
-            </p:style>
-            <p:txBody>
-              <a:bodyPr rtlCol="0" anchor="ctr"/>
-              <a:lstStyle/>
-              <a:p>
-                <a:pPr algn="ctr"/>
-                <a:endParaRPr lang="it-IT" dirty="0"/>
-              </a:p>
-            </p:txBody>
-          </p:sp>
-        </p:grpSp>
-        <p:sp>
-          <p:nvSpPr>
-            <p:cNvPr id="51" name="CasellaDiTesto 50">
-              <a:extLst>
-                <a:ext uri="{FF2B5EF4-FFF2-40B4-BE49-F238E27FC236}">
-                  <a16:creationId xmlns:a16="http://schemas.microsoft.com/office/drawing/2014/main" id="{578D9BDB-1941-03CE-7DB8-1F305B379A83}"/>
-                </a:ext>
-              </a:extLst>
-            </p:cNvPr>
-            <p:cNvSpPr txBox="1"/>
-            <p:nvPr/>
-          </p:nvSpPr>
-          <p:spPr>
-            <a:xfrm>
-              <a:off x="739768" y="3538694"/>
-              <a:ext cx="4417374" cy="369332"/>
-            </a:xfrm>
-            <a:prstGeom prst="rect">
-              <a:avLst/>
-            </a:prstGeom>
-            <a:noFill/>
-          </p:spPr>
-          <p:txBody>
-            <a:bodyPr wrap="square" rtlCol="0">
-              <a:spAutoFit/>
-            </a:bodyPr>
-            <a:lstStyle/>
-            <a:p>
-              <a:pPr algn="ctr"/>
-              <a:r>
-                <a:rPr lang="it-IT" b="1" dirty="0">
-                  <a:solidFill>
-                    <a:schemeClr val="bg1"/>
-                  </a:solidFill>
-                </a:rPr>
-                <a:t>Improves DNS-level threat visibility</a:t>
-              </a:r>
-            </a:p>
-          </p:txBody>
-        </p:sp>
-      </p:grpSp>
-      <p:pic>
-        <p:nvPicPr>
-          <p:cNvPr id="69" name="Immagine 68" descr="Immagine che contiene simbolo, logo, cerchio, Elementi grafici&#10;&#10;Il contenuto generato dall'IA potrebbe non essere corretto.">
-            <a:extLst>
-              <a:ext uri="{FF2B5EF4-FFF2-40B4-BE49-F238E27FC236}">
-                <a16:creationId xmlns:a16="http://schemas.microsoft.com/office/drawing/2014/main" id="{DD505F3B-0BDC-28A8-1CEB-8A3FB98055B1}"/>
-              </a:ext>
-            </a:extLst>
-          </p:cNvPr>
-          <p:cNvPicPr>
-            <a:picLocks noChangeAspect="1"/>
-          </p:cNvPicPr>
-          <p:nvPr/>
-        </p:nvPicPr>
-        <p:blipFill>
-          <a:blip r:embed="rId2">
-            <a:extLst>
-              <a:ext uri="{28A0092B-C50C-407E-A947-70E740481C1C}">
-                <a14:useLocalDpi xmlns:a14="http://schemas.microsoft.com/office/drawing/2010/main" val="0"/>
-              </a:ext>
-            </a:extLst>
-          </a:blip>
-          <a:stretch>
-            <a:fillRect/>
-          </a:stretch>
-        </p:blipFill>
-        <p:spPr>
-          <a:xfrm>
-            <a:off x="2026575" y="1772478"/>
-            <a:ext cx="3313043" cy="3313043"/>
-          </a:xfrm>
-          <a:prstGeom prst="rect">
-            <a:avLst/>
-          </a:prstGeom>
-        </p:spPr>
-      </p:pic>
       <p:sp>
         <p:nvSpPr>
-          <p:cNvPr id="70" name="CasellaDiTesto 69">
-            <a:extLst>
-              <a:ext uri="{FF2B5EF4-FFF2-40B4-BE49-F238E27FC236}">
-                <a16:creationId xmlns:a16="http://schemas.microsoft.com/office/drawing/2014/main" id="{85BD14A3-3953-4475-A81E-A53EB9AA1A45}"/>
+          <p:cNvPr id="41" name="CasellaDiTesto 40">
+            <a:extLst>
+              <a:ext uri="{FF2B5EF4-FFF2-40B4-BE49-F238E27FC236}">
+                <a16:creationId xmlns:a16="http://schemas.microsoft.com/office/drawing/2014/main" id="{B4F4EBA0-371A-A945-06D1-DDD7E93B8F2E}"/>
               </a:ext>
             </a:extLst>
           </p:cNvPr>
@@ -14447,8 +13725,8 @@
         </p:nvSpPr>
         <p:spPr>
           <a:xfrm>
-            <a:off x="2783776" y="4778233"/>
-            <a:ext cx="1931506" cy="461665"/>
+            <a:off x="6453038" y="4033646"/>
+            <a:ext cx="4600408" cy="369332"/>
           </a:xfrm>
           <a:prstGeom prst="rect">
             <a:avLst/>
@@ -14461,6 +13739,685 @@
           </a:bodyPr>
           <a:lstStyle/>
           <a:p>
+            <a:pPr algn="ctr"/>
+            <a:r>
+              <a:rPr lang="it-IT" b="1" dirty="0">
+                <a:solidFill>
+                  <a:schemeClr val="bg1"/>
+                </a:solidFill>
+              </a:rPr>
+              <a:t>Expose coordinated or persistent threats</a:t>
+            </a:r>
+          </a:p>
+        </p:txBody>
+      </p:sp>
+      <p:grpSp>
+        <p:nvGrpSpPr>
+          <p:cNvPr id="30" name="Gruppo 29">
+            <a:extLst>
+              <a:ext uri="{FF2B5EF4-FFF2-40B4-BE49-F238E27FC236}">
+                <a16:creationId xmlns:a16="http://schemas.microsoft.com/office/drawing/2014/main" id="{763349E4-901D-68F3-A81B-51E2DC500AD2}"/>
+              </a:ext>
+            </a:extLst>
+          </p:cNvPr>
+          <p:cNvGrpSpPr/>
+          <p:nvPr/>
+        </p:nvGrpSpPr>
+        <p:grpSpPr>
+          <a:xfrm>
+            <a:off x="6460429" y="1813782"/>
+            <a:ext cx="4681024" cy="581866"/>
+            <a:chOff x="1701101" y="1802916"/>
+            <a:chExt cx="8886021" cy="3784578"/>
+          </a:xfrm>
+        </p:grpSpPr>
+        <p:sp>
+          <p:nvSpPr>
+            <p:cNvPr id="31" name="Rettangolo con angoli arrotondati 30">
+              <a:extLst>
+                <a:ext uri="{FF2B5EF4-FFF2-40B4-BE49-F238E27FC236}">
+                  <a16:creationId xmlns:a16="http://schemas.microsoft.com/office/drawing/2014/main" id="{FF1DB698-421C-7238-B166-9ABB1C8844AA}"/>
+                </a:ext>
+              </a:extLst>
+            </p:cNvPr>
+            <p:cNvSpPr/>
+            <p:nvPr/>
+          </p:nvSpPr>
+          <p:spPr>
+            <a:xfrm>
+              <a:off x="1797325" y="1897480"/>
+              <a:ext cx="8789797" cy="3690014"/>
+            </a:xfrm>
+            <a:prstGeom prst="roundRect">
+              <a:avLst/>
+            </a:prstGeom>
+            <a:solidFill>
+              <a:schemeClr val="tx1"/>
+            </a:solidFill>
+            <a:ln>
+              <a:solidFill>
+                <a:schemeClr val="tx1"/>
+              </a:solidFill>
+            </a:ln>
+          </p:spPr>
+          <p:style>
+            <a:lnRef idx="2">
+              <a:schemeClr val="accent1">
+                <a:shade val="15000"/>
+              </a:schemeClr>
+            </a:lnRef>
+            <a:fillRef idx="1">
+              <a:schemeClr val="accent1"/>
+            </a:fillRef>
+            <a:effectRef idx="0">
+              <a:schemeClr val="accent1"/>
+            </a:effectRef>
+            <a:fontRef idx="minor">
+              <a:schemeClr val="lt1"/>
+            </a:fontRef>
+          </p:style>
+          <p:txBody>
+            <a:bodyPr rtlCol="0" anchor="ctr"/>
+            <a:lstStyle/>
+            <a:p>
+              <a:pPr algn="ctr"/>
+              <a:endParaRPr lang="it-IT" dirty="0"/>
+            </a:p>
+          </p:txBody>
+        </p:sp>
+        <p:sp>
+          <p:nvSpPr>
+            <p:cNvPr id="36" name="Rettangolo con angoli arrotondati 35">
+              <a:extLst>
+                <a:ext uri="{FF2B5EF4-FFF2-40B4-BE49-F238E27FC236}">
+                  <a16:creationId xmlns:a16="http://schemas.microsoft.com/office/drawing/2014/main" id="{613CFEBA-8291-1D57-1503-F393EFDB019D}"/>
+                </a:ext>
+              </a:extLst>
+            </p:cNvPr>
+            <p:cNvSpPr/>
+            <p:nvPr/>
+          </p:nvSpPr>
+          <p:spPr>
+            <a:xfrm>
+              <a:off x="1701101" y="1802916"/>
+              <a:ext cx="8789797" cy="3690014"/>
+            </a:xfrm>
+            <a:prstGeom prst="roundRect">
+              <a:avLst/>
+            </a:prstGeom>
+            <a:solidFill>
+              <a:srgbClr val="012F5F"/>
+            </a:solidFill>
+            <a:ln>
+              <a:solidFill>
+                <a:srgbClr val="012F5F"/>
+              </a:solidFill>
+            </a:ln>
+          </p:spPr>
+          <p:style>
+            <a:lnRef idx="2">
+              <a:schemeClr val="accent1">
+                <a:shade val="15000"/>
+              </a:schemeClr>
+            </a:lnRef>
+            <a:fillRef idx="1">
+              <a:schemeClr val="accent1"/>
+            </a:fillRef>
+            <a:effectRef idx="0">
+              <a:schemeClr val="accent1"/>
+            </a:effectRef>
+            <a:fontRef idx="minor">
+              <a:schemeClr val="lt1"/>
+            </a:fontRef>
+          </p:style>
+          <p:txBody>
+            <a:bodyPr rtlCol="0" anchor="ctr"/>
+            <a:lstStyle/>
+            <a:p>
+              <a:pPr algn="ctr"/>
+              <a:endParaRPr lang="it-IT" dirty="0"/>
+            </a:p>
+          </p:txBody>
+        </p:sp>
+      </p:grpSp>
+      <p:grpSp>
+        <p:nvGrpSpPr>
+          <p:cNvPr id="37" name="Gruppo 36">
+            <a:extLst>
+              <a:ext uri="{FF2B5EF4-FFF2-40B4-BE49-F238E27FC236}">
+                <a16:creationId xmlns:a16="http://schemas.microsoft.com/office/drawing/2014/main" id="{7F00A14D-48B9-90A5-EBED-C0AC952E5BDE}"/>
+              </a:ext>
+            </a:extLst>
+          </p:cNvPr>
+          <p:cNvGrpSpPr/>
+          <p:nvPr/>
+        </p:nvGrpSpPr>
+        <p:grpSpPr>
+          <a:xfrm>
+            <a:off x="6460429" y="3235686"/>
+            <a:ext cx="4681024" cy="553151"/>
+            <a:chOff x="1701101" y="1802916"/>
+            <a:chExt cx="8886021" cy="3784578"/>
+          </a:xfrm>
+        </p:grpSpPr>
+        <p:sp>
+          <p:nvSpPr>
+            <p:cNvPr id="42" name="Rettangolo con angoli arrotondati 41">
+              <a:extLst>
+                <a:ext uri="{FF2B5EF4-FFF2-40B4-BE49-F238E27FC236}">
+                  <a16:creationId xmlns:a16="http://schemas.microsoft.com/office/drawing/2014/main" id="{488AFC25-4B23-EE12-685C-DA46AC996CAD}"/>
+                </a:ext>
+              </a:extLst>
+            </p:cNvPr>
+            <p:cNvSpPr/>
+            <p:nvPr/>
+          </p:nvSpPr>
+          <p:spPr>
+            <a:xfrm>
+              <a:off x="1797325" y="1897480"/>
+              <a:ext cx="8789797" cy="3690014"/>
+            </a:xfrm>
+            <a:prstGeom prst="roundRect">
+              <a:avLst/>
+            </a:prstGeom>
+            <a:solidFill>
+              <a:schemeClr val="tx1"/>
+            </a:solidFill>
+            <a:ln>
+              <a:solidFill>
+                <a:schemeClr val="tx1"/>
+              </a:solidFill>
+            </a:ln>
+          </p:spPr>
+          <p:style>
+            <a:lnRef idx="2">
+              <a:schemeClr val="accent1">
+                <a:shade val="15000"/>
+              </a:schemeClr>
+            </a:lnRef>
+            <a:fillRef idx="1">
+              <a:schemeClr val="accent1"/>
+            </a:fillRef>
+            <a:effectRef idx="0">
+              <a:schemeClr val="accent1"/>
+            </a:effectRef>
+            <a:fontRef idx="minor">
+              <a:schemeClr val="lt1"/>
+            </a:fontRef>
+          </p:style>
+          <p:txBody>
+            <a:bodyPr rtlCol="0" anchor="ctr"/>
+            <a:lstStyle/>
+            <a:p>
+              <a:pPr algn="ctr"/>
+              <a:endParaRPr lang="it-IT" dirty="0"/>
+            </a:p>
+          </p:txBody>
+        </p:sp>
+        <p:sp>
+          <p:nvSpPr>
+            <p:cNvPr id="43" name="Rettangolo con angoli arrotondati 42">
+              <a:extLst>
+                <a:ext uri="{FF2B5EF4-FFF2-40B4-BE49-F238E27FC236}">
+                  <a16:creationId xmlns:a16="http://schemas.microsoft.com/office/drawing/2014/main" id="{D995F95A-F4E9-6692-A133-2D700DB34EDB}"/>
+                </a:ext>
+              </a:extLst>
+            </p:cNvPr>
+            <p:cNvSpPr/>
+            <p:nvPr/>
+          </p:nvSpPr>
+          <p:spPr>
+            <a:xfrm>
+              <a:off x="1701101" y="1802916"/>
+              <a:ext cx="8789797" cy="3690014"/>
+            </a:xfrm>
+            <a:prstGeom prst="roundRect">
+              <a:avLst/>
+            </a:prstGeom>
+            <a:solidFill>
+              <a:srgbClr val="012F5F"/>
+            </a:solidFill>
+            <a:ln>
+              <a:solidFill>
+                <a:srgbClr val="012F5F"/>
+              </a:solidFill>
+            </a:ln>
+          </p:spPr>
+          <p:style>
+            <a:lnRef idx="2">
+              <a:schemeClr val="accent1">
+                <a:shade val="15000"/>
+              </a:schemeClr>
+            </a:lnRef>
+            <a:fillRef idx="1">
+              <a:schemeClr val="accent1"/>
+            </a:fillRef>
+            <a:effectRef idx="0">
+              <a:schemeClr val="accent1"/>
+            </a:effectRef>
+            <a:fontRef idx="minor">
+              <a:schemeClr val="lt1"/>
+            </a:fontRef>
+          </p:style>
+          <p:txBody>
+            <a:bodyPr rtlCol="0" anchor="ctr"/>
+            <a:lstStyle/>
+            <a:p>
+              <a:pPr algn="ctr"/>
+              <a:endParaRPr lang="it-IT" dirty="0"/>
+            </a:p>
+          </p:txBody>
+        </p:sp>
+      </p:grpSp>
+      <p:sp>
+        <p:nvSpPr>
+          <p:cNvPr id="52" name="CasellaDiTesto 51">
+            <a:extLst>
+              <a:ext uri="{FF2B5EF4-FFF2-40B4-BE49-F238E27FC236}">
+                <a16:creationId xmlns:a16="http://schemas.microsoft.com/office/drawing/2014/main" id="{05A329E6-7773-ED96-8881-1DFD30510367}"/>
+              </a:ext>
+            </a:extLst>
+          </p:cNvPr>
+          <p:cNvSpPr txBox="1"/>
+          <p:nvPr/>
+        </p:nvSpPr>
+        <p:spPr>
+          <a:xfrm>
+            <a:off x="6460429" y="1897754"/>
+            <a:ext cx="4630335" cy="369332"/>
+          </a:xfrm>
+          <a:prstGeom prst="rect">
+            <a:avLst/>
+          </a:prstGeom>
+          <a:noFill/>
+        </p:spPr>
+        <p:txBody>
+          <a:bodyPr wrap="square" rtlCol="0">
+            <a:spAutoFit/>
+          </a:bodyPr>
+          <a:lstStyle/>
+          <a:p>
+            <a:pPr algn="ctr"/>
+            <a:r>
+              <a:rPr lang="it-IT" b="1" dirty="0">
+                <a:solidFill>
+                  <a:schemeClr val="bg1"/>
+                </a:solidFill>
+              </a:rPr>
+              <a:t>Early detection of malware infections</a:t>
+            </a:r>
+          </a:p>
+        </p:txBody>
+      </p:sp>
+      <p:sp>
+        <p:nvSpPr>
+          <p:cNvPr id="53" name="CasellaDiTesto 52">
+            <a:extLst>
+              <a:ext uri="{FF2B5EF4-FFF2-40B4-BE49-F238E27FC236}">
+                <a16:creationId xmlns:a16="http://schemas.microsoft.com/office/drawing/2014/main" id="{1A08EC31-A028-1F7A-DCFD-9804B010E6EE}"/>
+              </a:ext>
+            </a:extLst>
+          </p:cNvPr>
+          <p:cNvSpPr txBox="1"/>
+          <p:nvPr/>
+        </p:nvSpPr>
+        <p:spPr>
+          <a:xfrm>
+            <a:off x="6460429" y="3284876"/>
+            <a:ext cx="4593017" cy="369332"/>
+          </a:xfrm>
+          <a:prstGeom prst="rect">
+            <a:avLst/>
+          </a:prstGeom>
+          <a:noFill/>
+        </p:spPr>
+        <p:txBody>
+          <a:bodyPr wrap="square" rtlCol="0">
+            <a:spAutoFit/>
+          </a:bodyPr>
+          <a:lstStyle/>
+          <a:p>
+            <a:pPr algn="ctr"/>
+            <a:r>
+              <a:rPr lang="it-IT" b="1" dirty="0">
+                <a:solidFill>
+                  <a:schemeClr val="bg1"/>
+                </a:solidFill>
+              </a:rPr>
+              <a:t>Improves DNS-level threat visibility</a:t>
+            </a:r>
+          </a:p>
+        </p:txBody>
+      </p:sp>
+      <p:pic>
+        <p:nvPicPr>
+          <p:cNvPr id="54" name="Immagine 53" descr="Immagine che contiene simbolo, logo, cerchio, Elementi grafici&#10;&#10;Il contenuto generato dall'IA potrebbe non essere corretto.">
+            <a:extLst>
+              <a:ext uri="{FF2B5EF4-FFF2-40B4-BE49-F238E27FC236}">
+                <a16:creationId xmlns:a16="http://schemas.microsoft.com/office/drawing/2014/main" id="{173E258D-9483-351F-A700-2FB2824A7FB7}"/>
+              </a:ext>
+            </a:extLst>
+          </p:cNvPr>
+          <p:cNvPicPr>
+            <a:picLocks noChangeAspect="1"/>
+          </p:cNvPicPr>
+          <p:nvPr/>
+        </p:nvPicPr>
+        <p:blipFill>
+          <a:blip r:embed="rId2">
+            <a:extLst>
+              <a:ext uri="{28A0092B-C50C-407E-A947-70E740481C1C}">
+                <a14:useLocalDpi xmlns:a14="http://schemas.microsoft.com/office/drawing/2010/main" val="0"/>
+              </a:ext>
+            </a:extLst>
+          </a:blip>
+          <a:stretch>
+            <a:fillRect/>
+          </a:stretch>
+        </p:blipFill>
+        <p:spPr>
+          <a:xfrm>
+            <a:off x="1239078" y="1848708"/>
+            <a:ext cx="3313043" cy="3313043"/>
+          </a:xfrm>
+          <a:prstGeom prst="rect">
+            <a:avLst/>
+          </a:prstGeom>
+        </p:spPr>
+      </p:pic>
+      <p:cxnSp>
+        <p:nvCxnSpPr>
+          <p:cNvPr id="57" name="Connettore a gomito 56">
+            <a:extLst>
+              <a:ext uri="{FF2B5EF4-FFF2-40B4-BE49-F238E27FC236}">
+                <a16:creationId xmlns:a16="http://schemas.microsoft.com/office/drawing/2014/main" id="{047E164B-F893-CFC5-A57A-3A5E37E7C208}"/>
+              </a:ext>
+            </a:extLst>
+          </p:cNvPr>
+          <p:cNvCxnSpPr>
+            <a:cxnSpLocks/>
+            <a:stCxn id="54" idx="3"/>
+            <a:endCxn id="43" idx="1"/>
+          </p:cNvCxnSpPr>
+          <p:nvPr/>
+        </p:nvCxnSpPr>
+        <p:spPr>
+          <a:xfrm>
+            <a:off x="4552121" y="3505230"/>
+            <a:ext cx="1908308" cy="121"/>
+          </a:xfrm>
+          <a:prstGeom prst="bentConnector3">
+            <a:avLst>
+              <a:gd name="adj1" fmla="val 50000"/>
+            </a:avLst>
+          </a:prstGeom>
+          <a:ln>
+            <a:solidFill>
+              <a:schemeClr val="bg1"/>
+            </a:solidFill>
+            <a:tailEnd type="triangle"/>
+          </a:ln>
+        </p:spPr>
+        <p:style>
+          <a:lnRef idx="2">
+            <a:schemeClr val="accent1"/>
+          </a:lnRef>
+          <a:fillRef idx="0">
+            <a:schemeClr val="accent1"/>
+          </a:fillRef>
+          <a:effectRef idx="1">
+            <a:schemeClr val="accent1"/>
+          </a:effectRef>
+          <a:fontRef idx="minor">
+            <a:schemeClr val="tx1"/>
+          </a:fontRef>
+        </p:style>
+      </p:cxnSp>
+      <p:cxnSp>
+        <p:nvCxnSpPr>
+          <p:cNvPr id="58" name="Connettore a gomito 57">
+            <a:extLst>
+              <a:ext uri="{FF2B5EF4-FFF2-40B4-BE49-F238E27FC236}">
+                <a16:creationId xmlns:a16="http://schemas.microsoft.com/office/drawing/2014/main" id="{14D5DF1E-1594-A09C-772A-95A305342A67}"/>
+              </a:ext>
+            </a:extLst>
+          </p:cNvPr>
+          <p:cNvCxnSpPr>
+            <a:cxnSpLocks/>
+            <a:stCxn id="54" idx="3"/>
+            <a:endCxn id="52" idx="1"/>
+          </p:cNvCxnSpPr>
+          <p:nvPr/>
+        </p:nvCxnSpPr>
+        <p:spPr>
+          <a:xfrm flipV="1">
+            <a:off x="4552121" y="2082420"/>
+            <a:ext cx="1908308" cy="1422810"/>
+          </a:xfrm>
+          <a:prstGeom prst="bentConnector3">
+            <a:avLst>
+              <a:gd name="adj1" fmla="val 50000"/>
+            </a:avLst>
+          </a:prstGeom>
+          <a:ln>
+            <a:solidFill>
+              <a:schemeClr val="bg1"/>
+            </a:solidFill>
+            <a:tailEnd type="triangle"/>
+          </a:ln>
+        </p:spPr>
+        <p:style>
+          <a:lnRef idx="2">
+            <a:schemeClr val="accent1"/>
+          </a:lnRef>
+          <a:fillRef idx="0">
+            <a:schemeClr val="accent1"/>
+          </a:fillRef>
+          <a:effectRef idx="1">
+            <a:schemeClr val="accent1"/>
+          </a:effectRef>
+          <a:fontRef idx="minor">
+            <a:schemeClr val="tx1"/>
+          </a:fontRef>
+        </p:style>
+      </p:cxnSp>
+      <p:grpSp>
+        <p:nvGrpSpPr>
+          <p:cNvPr id="59" name="Gruppo 58">
+            <a:extLst>
+              <a:ext uri="{FF2B5EF4-FFF2-40B4-BE49-F238E27FC236}">
+                <a16:creationId xmlns:a16="http://schemas.microsoft.com/office/drawing/2014/main" id="{30DAEFF2-0599-6804-5CAC-0FF1B3C6D91B}"/>
+              </a:ext>
+            </a:extLst>
+          </p:cNvPr>
+          <p:cNvGrpSpPr/>
+          <p:nvPr/>
+        </p:nvGrpSpPr>
+        <p:grpSpPr>
+          <a:xfrm>
+            <a:off x="6460429" y="2537621"/>
+            <a:ext cx="4681024" cy="567327"/>
+            <a:chOff x="1701101" y="1802916"/>
+            <a:chExt cx="8886021" cy="3784578"/>
+          </a:xfrm>
+        </p:grpSpPr>
+        <p:sp>
+          <p:nvSpPr>
+            <p:cNvPr id="60" name="Rettangolo con angoli arrotondati 59">
+              <a:extLst>
+                <a:ext uri="{FF2B5EF4-FFF2-40B4-BE49-F238E27FC236}">
+                  <a16:creationId xmlns:a16="http://schemas.microsoft.com/office/drawing/2014/main" id="{34ACC5B6-42D2-EB98-BB7F-63A82FF01777}"/>
+                </a:ext>
+              </a:extLst>
+            </p:cNvPr>
+            <p:cNvSpPr/>
+            <p:nvPr/>
+          </p:nvSpPr>
+          <p:spPr>
+            <a:xfrm>
+              <a:off x="1797325" y="1897480"/>
+              <a:ext cx="8789797" cy="3690014"/>
+            </a:xfrm>
+            <a:prstGeom prst="roundRect">
+              <a:avLst/>
+            </a:prstGeom>
+            <a:solidFill>
+              <a:schemeClr val="tx1"/>
+            </a:solidFill>
+            <a:ln>
+              <a:solidFill>
+                <a:schemeClr val="tx1"/>
+              </a:solidFill>
+            </a:ln>
+          </p:spPr>
+          <p:style>
+            <a:lnRef idx="2">
+              <a:schemeClr val="accent1">
+                <a:shade val="15000"/>
+              </a:schemeClr>
+            </a:lnRef>
+            <a:fillRef idx="1">
+              <a:schemeClr val="accent1"/>
+            </a:fillRef>
+            <a:effectRef idx="0">
+              <a:schemeClr val="accent1"/>
+            </a:effectRef>
+            <a:fontRef idx="minor">
+              <a:schemeClr val="lt1"/>
+            </a:fontRef>
+          </p:style>
+          <p:txBody>
+            <a:bodyPr rtlCol="0" anchor="ctr"/>
+            <a:lstStyle/>
+            <a:p>
+              <a:pPr algn="ctr"/>
+              <a:endParaRPr lang="it-IT" dirty="0"/>
+            </a:p>
+          </p:txBody>
+        </p:sp>
+        <p:sp>
+          <p:nvSpPr>
+            <p:cNvPr id="61" name="Rettangolo con angoli arrotondati 60">
+              <a:extLst>
+                <a:ext uri="{FF2B5EF4-FFF2-40B4-BE49-F238E27FC236}">
+                  <a16:creationId xmlns:a16="http://schemas.microsoft.com/office/drawing/2014/main" id="{71EB7E2E-489F-89E9-6949-3D9891973D61}"/>
+                </a:ext>
+              </a:extLst>
+            </p:cNvPr>
+            <p:cNvSpPr/>
+            <p:nvPr/>
+          </p:nvSpPr>
+          <p:spPr>
+            <a:xfrm>
+              <a:off x="1701101" y="1802916"/>
+              <a:ext cx="8789797" cy="3690014"/>
+            </a:xfrm>
+            <a:prstGeom prst="roundRect">
+              <a:avLst/>
+            </a:prstGeom>
+            <a:solidFill>
+              <a:srgbClr val="012F5F"/>
+            </a:solidFill>
+            <a:ln>
+              <a:solidFill>
+                <a:srgbClr val="012F5F"/>
+              </a:solidFill>
+            </a:ln>
+          </p:spPr>
+          <p:style>
+            <a:lnRef idx="2">
+              <a:schemeClr val="accent1">
+                <a:shade val="15000"/>
+              </a:schemeClr>
+            </a:lnRef>
+            <a:fillRef idx="1">
+              <a:schemeClr val="accent1"/>
+            </a:fillRef>
+            <a:effectRef idx="0">
+              <a:schemeClr val="accent1"/>
+            </a:effectRef>
+            <a:fontRef idx="minor">
+              <a:schemeClr val="lt1"/>
+            </a:fontRef>
+          </p:style>
+          <p:txBody>
+            <a:bodyPr rtlCol="0" anchor="ctr"/>
+            <a:lstStyle/>
+            <a:p>
+              <a:pPr algn="ctr"/>
+              <a:endParaRPr lang="it-IT" dirty="0"/>
+            </a:p>
+          </p:txBody>
+        </p:sp>
+      </p:grpSp>
+      <p:sp>
+        <p:nvSpPr>
+          <p:cNvPr id="62" name="CasellaDiTesto 61">
+            <a:extLst>
+              <a:ext uri="{FF2B5EF4-FFF2-40B4-BE49-F238E27FC236}">
+                <a16:creationId xmlns:a16="http://schemas.microsoft.com/office/drawing/2014/main" id="{592A30AF-B544-1C33-EC0A-085F6B3C5D79}"/>
+              </a:ext>
+            </a:extLst>
+          </p:cNvPr>
+          <p:cNvSpPr txBox="1"/>
+          <p:nvPr/>
+        </p:nvSpPr>
+        <p:spPr>
+          <a:xfrm>
+            <a:off x="6460429" y="2621593"/>
+            <a:ext cx="4593017" cy="369332"/>
+          </a:xfrm>
+          <a:prstGeom prst="rect">
+            <a:avLst/>
+          </a:prstGeom>
+          <a:noFill/>
+        </p:spPr>
+        <p:txBody>
+          <a:bodyPr wrap="square" rtlCol="0">
+            <a:spAutoFit/>
+          </a:bodyPr>
+          <a:lstStyle/>
+          <a:p>
+            <a:pPr algn="ctr"/>
+            <a:r>
+              <a:rPr lang="it-IT" b="1" dirty="0">
+                <a:solidFill>
+                  <a:schemeClr val="bg1"/>
+                </a:solidFill>
+              </a:rPr>
+              <a:t>Unconver data exfiltration attempts</a:t>
+            </a:r>
+          </a:p>
+        </p:txBody>
+      </p:sp>
+      <p:sp>
+        <p:nvSpPr>
+          <p:cNvPr id="64" name="CasellaDiTesto 63">
+            <a:extLst>
+              <a:ext uri="{FF2B5EF4-FFF2-40B4-BE49-F238E27FC236}">
+                <a16:creationId xmlns:a16="http://schemas.microsoft.com/office/drawing/2014/main" id="{18C93EF8-FAC7-F8E1-7E9F-794D40A1EA1F}"/>
+              </a:ext>
+            </a:extLst>
+          </p:cNvPr>
+          <p:cNvSpPr txBox="1"/>
+          <p:nvPr/>
+        </p:nvSpPr>
+        <p:spPr>
+          <a:xfrm>
+            <a:off x="2045804" y="4970105"/>
+            <a:ext cx="1931506" cy="461665"/>
+          </a:xfrm>
+          <a:prstGeom prst="rect">
+            <a:avLst/>
+          </a:prstGeom>
+          <a:noFill/>
+        </p:spPr>
+        <p:txBody>
+          <a:bodyPr wrap="square" rtlCol="0">
+            <a:spAutoFit/>
+          </a:bodyPr>
+          <a:lstStyle/>
+          <a:p>
             <a:r>
               <a:rPr lang="it-IT" sz="2400" b="1" spc="-150" dirty="0">
                 <a:solidFill>
@@ -14472,6 +14429,150 @@
           </a:p>
         </p:txBody>
       </p:sp>
+      <p:cxnSp>
+        <p:nvCxnSpPr>
+          <p:cNvPr id="78" name="Connettore a gomito 77">
+            <a:extLst>
+              <a:ext uri="{FF2B5EF4-FFF2-40B4-BE49-F238E27FC236}">
+                <a16:creationId xmlns:a16="http://schemas.microsoft.com/office/drawing/2014/main" id="{3F641F56-72F3-5F62-2469-1697AD5FD113}"/>
+              </a:ext>
+            </a:extLst>
+          </p:cNvPr>
+          <p:cNvCxnSpPr>
+            <a:cxnSpLocks/>
+            <a:stCxn id="54" idx="3"/>
+            <a:endCxn id="62" idx="1"/>
+          </p:cNvCxnSpPr>
+          <p:nvPr/>
+        </p:nvCxnSpPr>
+        <p:spPr>
+          <a:xfrm flipV="1">
+            <a:off x="4552121" y="2806259"/>
+            <a:ext cx="1908308" cy="698971"/>
+          </a:xfrm>
+          <a:prstGeom prst="bentConnector3">
+            <a:avLst>
+              <a:gd name="adj1" fmla="val 50000"/>
+            </a:avLst>
+          </a:prstGeom>
+          <a:ln>
+            <a:solidFill>
+              <a:schemeClr val="bg1"/>
+            </a:solidFill>
+            <a:tailEnd type="triangle"/>
+          </a:ln>
+        </p:spPr>
+        <p:style>
+          <a:lnRef idx="2">
+            <a:schemeClr val="accent1"/>
+          </a:lnRef>
+          <a:fillRef idx="0">
+            <a:schemeClr val="accent1"/>
+          </a:fillRef>
+          <a:effectRef idx="1">
+            <a:schemeClr val="accent1"/>
+          </a:effectRef>
+          <a:fontRef idx="minor">
+            <a:schemeClr val="tx1"/>
+          </a:fontRef>
+        </p:style>
+      </p:cxnSp>
+      <p:cxnSp>
+        <p:nvCxnSpPr>
+          <p:cNvPr id="84" name="Connettore a gomito 83">
+            <a:extLst>
+              <a:ext uri="{FF2B5EF4-FFF2-40B4-BE49-F238E27FC236}">
+                <a16:creationId xmlns:a16="http://schemas.microsoft.com/office/drawing/2014/main" id="{131A6CB2-7F39-06D3-EF06-6C70BB601B8B}"/>
+              </a:ext>
+            </a:extLst>
+          </p:cNvPr>
+          <p:cNvCxnSpPr>
+            <a:cxnSpLocks/>
+            <a:stCxn id="54" idx="3"/>
+            <a:endCxn id="41" idx="1"/>
+          </p:cNvCxnSpPr>
+          <p:nvPr/>
+        </p:nvCxnSpPr>
+        <p:spPr>
+          <a:xfrm>
+            <a:off x="4552121" y="3505230"/>
+            <a:ext cx="1900917" cy="713082"/>
+          </a:xfrm>
+          <a:prstGeom prst="bentConnector3">
+            <a:avLst>
+              <a:gd name="adj1" fmla="val 50000"/>
+            </a:avLst>
+          </a:prstGeom>
+          <a:ln>
+            <a:solidFill>
+              <a:schemeClr val="bg1"/>
+            </a:solidFill>
+            <a:tailEnd type="triangle"/>
+          </a:ln>
+        </p:spPr>
+        <p:style>
+          <a:lnRef idx="2">
+            <a:schemeClr val="accent1"/>
+          </a:lnRef>
+          <a:fillRef idx="0">
+            <a:schemeClr val="accent1"/>
+          </a:fillRef>
+          <a:effectRef idx="1">
+            <a:schemeClr val="accent1"/>
+          </a:effectRef>
+          <a:fontRef idx="minor">
+            <a:schemeClr val="tx1"/>
+          </a:fontRef>
+        </p:style>
+      </p:cxnSp>
+      <p:cxnSp>
+        <p:nvCxnSpPr>
+          <p:cNvPr id="87" name="Connettore a gomito 86">
+            <a:extLst>
+              <a:ext uri="{FF2B5EF4-FFF2-40B4-BE49-F238E27FC236}">
+                <a16:creationId xmlns:a16="http://schemas.microsoft.com/office/drawing/2014/main" id="{9E158986-124F-BB10-77F3-B69FCB44F180}"/>
+              </a:ext>
+            </a:extLst>
+          </p:cNvPr>
+          <p:cNvCxnSpPr>
+            <a:cxnSpLocks/>
+            <a:stCxn id="54" idx="3"/>
+            <a:endCxn id="47" idx="1"/>
+          </p:cNvCxnSpPr>
+          <p:nvPr/>
+        </p:nvCxnSpPr>
+        <p:spPr>
+          <a:xfrm>
+            <a:off x="4552121" y="3505230"/>
+            <a:ext cx="1918698" cy="1426043"/>
+          </a:xfrm>
+          <a:prstGeom prst="bentConnector3">
+            <a:avLst>
+              <a:gd name="adj1" fmla="val 49404"/>
+            </a:avLst>
+          </a:prstGeom>
+          <a:ln>
+            <a:solidFill>
+              <a:schemeClr val="bg1"/>
+            </a:solidFill>
+            <a:tailEnd type="triangle"/>
+          </a:ln>
+        </p:spPr>
+        <p:style>
+          <a:lnRef idx="2">
+            <a:schemeClr val="accent1"/>
+          </a:lnRef>
+          <a:fillRef idx="0">
+            <a:schemeClr val="accent1"/>
+          </a:fillRef>
+          <a:effectRef idx="1">
+            <a:schemeClr val="accent1"/>
+          </a:effectRef>
+          <a:fontRef idx="minor">
+            <a:schemeClr val="tx1"/>
+          </a:fontRef>
+        </p:style>
+      </p:cxnSp>
     </p:spTree>
     <p:extLst>
       <p:ext uri="{BB962C8B-B14F-4D97-AF65-F5344CB8AC3E}">

</xml_diff>